<commit_message>
Prepare for journal submission
</commit_message>
<xml_diff>
--- a/paper/lighter_diagrams.pptx
+++ b/paper/lighter_diagrams.pptx
@@ -199,7 +199,7 @@
           <a:p>
             <a:fld id="{AEF4BC77-B2DE-424C-8DD8-26708F192901}" type="datetimeFigureOut">
               <a:rPr lang="en-US" smtClean="0"/>
-              <a:t>2/18/25</a:t>
+              <a:t>2/27/25</a:t>
             </a:fld>
             <a:endParaRPr lang="en-US"/>
           </a:p>
@@ -697,7 +697,7 @@
           <a:p>
             <a:fld id="{F58FFE97-02FC-2C49-AA00-9E06CB09F09E}" type="datetimeFigureOut">
               <a:rPr lang="en-US" smtClean="0"/>
-              <a:t>2/18/25</a:t>
+              <a:t>2/27/25</a:t>
             </a:fld>
             <a:endParaRPr lang="en-US"/>
           </a:p>
@@ -895,7 +895,7 @@
           <a:p>
             <a:fld id="{F58FFE97-02FC-2C49-AA00-9E06CB09F09E}" type="datetimeFigureOut">
               <a:rPr lang="en-US" smtClean="0"/>
-              <a:t>2/18/25</a:t>
+              <a:t>2/27/25</a:t>
             </a:fld>
             <a:endParaRPr lang="en-US"/>
           </a:p>
@@ -1103,7 +1103,7 @@
           <a:p>
             <a:fld id="{F58FFE97-02FC-2C49-AA00-9E06CB09F09E}" type="datetimeFigureOut">
               <a:rPr lang="en-US" smtClean="0"/>
-              <a:t>2/18/25</a:t>
+              <a:t>2/27/25</a:t>
             </a:fld>
             <a:endParaRPr lang="en-US"/>
           </a:p>
@@ -1301,7 +1301,7 @@
           <a:p>
             <a:fld id="{F58FFE97-02FC-2C49-AA00-9E06CB09F09E}" type="datetimeFigureOut">
               <a:rPr lang="en-US" smtClean="0"/>
-              <a:t>2/18/25</a:t>
+              <a:t>2/27/25</a:t>
             </a:fld>
             <a:endParaRPr lang="en-US"/>
           </a:p>
@@ -1576,7 +1576,7 @@
           <a:p>
             <a:fld id="{F58FFE97-02FC-2C49-AA00-9E06CB09F09E}" type="datetimeFigureOut">
               <a:rPr lang="en-US" smtClean="0"/>
-              <a:t>2/18/25</a:t>
+              <a:t>2/27/25</a:t>
             </a:fld>
             <a:endParaRPr lang="en-US"/>
           </a:p>
@@ -1841,7 +1841,7 @@
           <a:p>
             <a:fld id="{F58FFE97-02FC-2C49-AA00-9E06CB09F09E}" type="datetimeFigureOut">
               <a:rPr lang="en-US" smtClean="0"/>
-              <a:t>2/18/25</a:t>
+              <a:t>2/27/25</a:t>
             </a:fld>
             <a:endParaRPr lang="en-US"/>
           </a:p>
@@ -2253,7 +2253,7 @@
           <a:p>
             <a:fld id="{F58FFE97-02FC-2C49-AA00-9E06CB09F09E}" type="datetimeFigureOut">
               <a:rPr lang="en-US" smtClean="0"/>
-              <a:t>2/18/25</a:t>
+              <a:t>2/27/25</a:t>
             </a:fld>
             <a:endParaRPr lang="en-US"/>
           </a:p>
@@ -2394,7 +2394,7 @@
           <a:p>
             <a:fld id="{F58FFE97-02FC-2C49-AA00-9E06CB09F09E}" type="datetimeFigureOut">
               <a:rPr lang="en-US" smtClean="0"/>
-              <a:t>2/18/25</a:t>
+              <a:t>2/27/25</a:t>
             </a:fld>
             <a:endParaRPr lang="en-US"/>
           </a:p>
@@ -2507,7 +2507,7 @@
           <a:p>
             <a:fld id="{F58FFE97-02FC-2C49-AA00-9E06CB09F09E}" type="datetimeFigureOut">
               <a:rPr lang="en-US" smtClean="0"/>
-              <a:t>2/18/25</a:t>
+              <a:t>2/27/25</a:t>
             </a:fld>
             <a:endParaRPr lang="en-US"/>
           </a:p>
@@ -2818,7 +2818,7 @@
           <a:p>
             <a:fld id="{F58FFE97-02FC-2C49-AA00-9E06CB09F09E}" type="datetimeFigureOut">
               <a:rPr lang="en-US" smtClean="0"/>
-              <a:t>2/18/25</a:t>
+              <a:t>2/27/25</a:t>
             </a:fld>
             <a:endParaRPr lang="en-US"/>
           </a:p>
@@ -3106,7 +3106,7 @@
           <a:p>
             <a:fld id="{F58FFE97-02FC-2C49-AA00-9E06CB09F09E}" type="datetimeFigureOut">
               <a:rPr lang="en-US" smtClean="0"/>
-              <a:t>2/18/25</a:t>
+              <a:t>2/27/25</a:t>
             </a:fld>
             <a:endParaRPr lang="en-US"/>
           </a:p>
@@ -3347,7 +3347,7 @@
           <a:p>
             <a:fld id="{F58FFE97-02FC-2C49-AA00-9E06CB09F09E}" type="datetimeFigureOut">
               <a:rPr lang="en-US" smtClean="0"/>
-              <a:t>2/18/25</a:t>
+              <a:t>2/27/25</a:t>
             </a:fld>
             <a:endParaRPr lang="en-US"/>
           </a:p>
@@ -3778,8 +3778,8 @@
         </p:nvSpPr>
         <p:spPr>
           <a:xfrm flipH="1">
-            <a:off x="3047934" y="3270282"/>
-            <a:ext cx="1223357" cy="488075"/>
+            <a:off x="4177032" y="3274898"/>
+            <a:ext cx="1502129" cy="516906"/>
           </a:xfrm>
           <a:prstGeom prst="rect">
             <a:avLst/>
@@ -3813,13 +3813,18 @@
           <a:p>
             <a:pPr algn="ctr"/>
             <a:r>
-              <a:rPr lang="en-US" sz="1100" noProof="0" dirty="0">
+              <a:rPr lang="en-US" sz="1400" noProof="0" dirty="0">
                 <a:solidFill>
                   <a:schemeClr val="bg1"/>
                 </a:solidFill>
               </a:rPr>
               <a:t>BatchAdapter</a:t>
             </a:r>
+            <a:endParaRPr lang="en-US" sz="1200" noProof="0" dirty="0">
+              <a:solidFill>
+                <a:schemeClr val="bg1"/>
+              </a:solidFill>
+            </a:endParaRPr>
           </a:p>
         </p:txBody>
       </p:sp>
@@ -3837,8 +3842,8 @@
         </p:nvSpPr>
         <p:spPr>
           <a:xfrm flipH="1">
-            <a:off x="7336178" y="2245940"/>
-            <a:ext cx="1223357" cy="488075"/>
+            <a:off x="8130574" y="2716723"/>
+            <a:ext cx="1502128" cy="516906"/>
           </a:xfrm>
           <a:prstGeom prst="rect">
             <a:avLst/>
@@ -3872,13 +3877,18 @@
           <a:p>
             <a:pPr algn="ctr"/>
             <a:r>
-              <a:rPr lang="en-US" sz="1100" dirty="0">
+              <a:rPr lang="en-US" sz="1400" dirty="0">
                 <a:solidFill>
                   <a:schemeClr val="bg1"/>
                 </a:solidFill>
               </a:rPr>
               <a:t>CriterionAdapter</a:t>
             </a:r>
+            <a:endParaRPr lang="en-US" sz="1100" dirty="0">
+              <a:solidFill>
+                <a:schemeClr val="bg1"/>
+              </a:solidFill>
+            </a:endParaRPr>
           </a:p>
         </p:txBody>
       </p:sp>
@@ -3896,8 +3906,8 @@
         </p:nvSpPr>
         <p:spPr>
           <a:xfrm flipH="1">
-            <a:off x="7336177" y="3268905"/>
-            <a:ext cx="1223357" cy="488075"/>
+            <a:off x="8130576" y="3274898"/>
+            <a:ext cx="1502126" cy="516905"/>
           </a:xfrm>
           <a:prstGeom prst="rect">
             <a:avLst/>
@@ -3931,7 +3941,7 @@
           <a:p>
             <a:pPr algn="ctr"/>
             <a:r>
-              <a:rPr lang="en-US" sz="1100" dirty="0">
+              <a:rPr lang="en-US" sz="1400" dirty="0">
                 <a:solidFill>
                   <a:schemeClr val="bg1"/>
                 </a:solidFill>
@@ -3955,8 +3965,8 @@
         </p:nvSpPr>
         <p:spPr>
           <a:xfrm flipH="1">
-            <a:off x="7336177" y="4291870"/>
-            <a:ext cx="1223357" cy="488075"/>
+            <a:off x="8130576" y="3842813"/>
+            <a:ext cx="1502128" cy="516905"/>
           </a:xfrm>
           <a:prstGeom prst="rect">
             <a:avLst/>
@@ -3990,22 +4000,27 @@
           <a:p>
             <a:pPr algn="ctr"/>
             <a:r>
-              <a:rPr lang="en-US" sz="1100" dirty="0">
+              <a:rPr lang="en-US" sz="1400" dirty="0">
                 <a:solidFill>
                   <a:schemeClr val="bg1"/>
                 </a:solidFill>
               </a:rPr>
               <a:t>LoggingAdapter</a:t>
             </a:r>
-          </a:p>
-        </p:txBody>
-      </p:sp>
-      <p:sp>
-        <p:nvSpPr>
-          <p:cNvPr id="10" name="Oval 9">
-            <a:extLst>
-              <a:ext uri="{FF2B5EF4-FFF2-40B4-BE49-F238E27FC236}">
-                <a16:creationId xmlns:a16="http://schemas.microsoft.com/office/drawing/2014/main" id="{1B99727A-A29C-EFE9-9FFD-30D31FCBD4DD}"/>
+            <a:endParaRPr lang="en-US" sz="1200" dirty="0">
+              <a:solidFill>
+                <a:schemeClr val="bg1"/>
+              </a:solidFill>
+            </a:endParaRPr>
+          </a:p>
+        </p:txBody>
+      </p:sp>
+      <p:sp>
+        <p:nvSpPr>
+          <p:cNvPr id="14" name="Rounded Rectangle 13">
+            <a:extLst>
+              <a:ext uri="{FF2B5EF4-FFF2-40B4-BE49-F238E27FC236}">
+                <a16:creationId xmlns:a16="http://schemas.microsoft.com/office/drawing/2014/main" id="{5C0750C7-E530-E12A-E33B-7CD0A7F62443}"/>
               </a:ext>
             </a:extLst>
           </p:cNvPr>
@@ -4014,126 +4029,8 @@
         </p:nvSpPr>
         <p:spPr>
           <a:xfrm>
-            <a:off x="1656262" y="1414983"/>
-            <a:ext cx="1295401" cy="488075"/>
-          </a:xfrm>
-          <a:prstGeom prst="ellipse">
-            <a:avLst/>
-          </a:prstGeom>
-          <a:solidFill>
-            <a:srgbClr val="4B585A"/>
-          </a:solidFill>
-          <a:ln>
-            <a:noFill/>
-          </a:ln>
-        </p:spPr>
-        <p:style>
-          <a:lnRef idx="2">
-            <a:schemeClr val="accent1">
-              <a:shade val="15000"/>
-            </a:schemeClr>
-          </a:lnRef>
-          <a:fillRef idx="1">
-            <a:schemeClr val="accent1"/>
-          </a:fillRef>
-          <a:effectRef idx="0">
-            <a:schemeClr val="accent1"/>
-          </a:effectRef>
-          <a:fontRef idx="minor">
-            <a:schemeClr val="lt1"/>
-          </a:fontRef>
-        </p:style>
-        <p:txBody>
-          <a:bodyPr rtlCol="0" anchor="ctr"/>
-          <a:lstStyle/>
-          <a:p>
-            <a:pPr algn="ctr"/>
-            <a:r>
-              <a:rPr lang="en-US" sz="1100" noProof="0" dirty="0">
-                <a:solidFill>
-                  <a:schemeClr val="bg1"/>
-                </a:solidFill>
-              </a:rPr>
-              <a:t>DataLoader</a:t>
-            </a:r>
-          </a:p>
-        </p:txBody>
-      </p:sp>
-      <p:sp>
-        <p:nvSpPr>
-          <p:cNvPr id="11" name="Oval 10">
-            <a:extLst>
-              <a:ext uri="{FF2B5EF4-FFF2-40B4-BE49-F238E27FC236}">
-                <a16:creationId xmlns:a16="http://schemas.microsoft.com/office/drawing/2014/main" id="{093AD793-A4BB-DB9E-6EC8-791B70D97922}"/>
-              </a:ext>
-            </a:extLst>
-          </p:cNvPr>
-          <p:cNvSpPr/>
-          <p:nvPr/>
-        </p:nvSpPr>
-        <p:spPr>
-          <a:xfrm>
-            <a:off x="4995693" y="1414983"/>
-            <a:ext cx="1295401" cy="488075"/>
-          </a:xfrm>
-          <a:prstGeom prst="ellipse">
-            <a:avLst/>
-          </a:prstGeom>
-          <a:solidFill>
-            <a:srgbClr val="4B585A"/>
-          </a:solidFill>
-          <a:ln>
-            <a:noFill/>
-          </a:ln>
-        </p:spPr>
-        <p:style>
-          <a:lnRef idx="2">
-            <a:schemeClr val="accent1">
-              <a:shade val="15000"/>
-            </a:schemeClr>
-          </a:lnRef>
-          <a:fillRef idx="1">
-            <a:schemeClr val="accent1"/>
-          </a:fillRef>
-          <a:effectRef idx="0">
-            <a:schemeClr val="accent1"/>
-          </a:effectRef>
-          <a:fontRef idx="minor">
-            <a:schemeClr val="lt1"/>
-          </a:fontRef>
-        </p:style>
-        <p:txBody>
-          <a:bodyPr rtlCol="0" anchor="ctr"/>
-          <a:lstStyle/>
-          <a:p>
-            <a:pPr algn="ctr"/>
-            <a:r>
-              <a:rPr lang="en-US" sz="1100" dirty="0">
-                <a:solidFill>
-                  <a:schemeClr val="bg1"/>
-                </a:solidFill>
-              </a:rPr>
-              <a:t>Model</a:t>
-            </a:r>
-          </a:p>
-        </p:txBody>
-      </p:sp>
-      <p:sp>
-        <p:nvSpPr>
-          <p:cNvPr id="14" name="Rounded Rectangle 13">
-            <a:extLst>
-              <a:ext uri="{FF2B5EF4-FFF2-40B4-BE49-F238E27FC236}">
-                <a16:creationId xmlns:a16="http://schemas.microsoft.com/office/drawing/2014/main" id="{5C0750C7-E530-E12A-E33B-7CD0A7F62443}"/>
-              </a:ext>
-            </a:extLst>
-          </p:cNvPr>
-          <p:cNvSpPr/>
-          <p:nvPr/>
-        </p:nvSpPr>
-        <p:spPr>
-          <a:xfrm>
-            <a:off x="4462909" y="4913423"/>
-            <a:ext cx="743971" cy="177242"/>
+            <a:off x="5895723" y="4290816"/>
+            <a:ext cx="907241" cy="305524"/>
           </a:xfrm>
           <a:prstGeom prst="roundRect">
             <a:avLst/>
@@ -4167,13 +4064,18 @@
           <a:p>
             <a:pPr algn="ctr"/>
             <a:r>
-              <a:rPr lang="en-US" sz="1100" dirty="0">
+              <a:rPr lang="en-US" sz="1400" dirty="0">
                 <a:solidFill>
                   <a:srgbClr val="459AA3"/>
                 </a:solidFill>
               </a:rPr>
               <a:t>identifier</a:t>
             </a:r>
+            <a:endParaRPr lang="en-US" sz="1200" dirty="0">
+              <a:solidFill>
+                <a:srgbClr val="459AA3"/>
+              </a:solidFill>
+            </a:endParaRPr>
           </a:p>
         </p:txBody>
       </p:sp>
@@ -4191,8 +4093,8 @@
         </p:nvSpPr>
         <p:spPr>
           <a:xfrm>
-            <a:off x="4480583" y="2391292"/>
-            <a:ext cx="743971" cy="177242"/>
+            <a:off x="5874761" y="2473406"/>
+            <a:ext cx="907241" cy="305524"/>
           </a:xfrm>
           <a:prstGeom prst="roundRect">
             <a:avLst/>
@@ -4226,7 +4128,7 @@
           <a:p>
             <a:pPr algn="ctr"/>
             <a:r>
-              <a:rPr lang="en-US" sz="1100" dirty="0">
+              <a:rPr lang="en-US" sz="1400" dirty="0">
                 <a:solidFill>
                   <a:srgbClr val="459AA3"/>
                 </a:solidFill>
@@ -4250,8 +4152,8 @@
         </p:nvSpPr>
         <p:spPr>
           <a:xfrm>
-            <a:off x="4462911" y="3424322"/>
-            <a:ext cx="743971" cy="177242"/>
+            <a:off x="5874155" y="3380588"/>
+            <a:ext cx="907241" cy="305524"/>
           </a:xfrm>
           <a:prstGeom prst="roundRect">
             <a:avLst/>
@@ -4285,13 +4187,18 @@
           <a:p>
             <a:pPr algn="ctr"/>
             <a:r>
-              <a:rPr lang="en-US" sz="1100" noProof="0" dirty="0">
+              <a:rPr lang="en-US" sz="1400" noProof="0" dirty="0">
                 <a:solidFill>
                   <a:srgbClr val="459AA3"/>
                 </a:solidFill>
               </a:rPr>
               <a:t>target</a:t>
             </a:r>
+            <a:endParaRPr lang="en-US" sz="1200" noProof="0" dirty="0">
+              <a:solidFill>
+                <a:srgbClr val="459AA3"/>
+              </a:solidFill>
+            </a:endParaRPr>
           </a:p>
         </p:txBody>
       </p:sp>
@@ -4309,8 +4216,8 @@
         </p:nvSpPr>
         <p:spPr>
           <a:xfrm>
-            <a:off x="6058037" y="2399980"/>
-            <a:ext cx="743971" cy="177242"/>
+            <a:off x="7085696" y="1873667"/>
+            <a:ext cx="907241" cy="305524"/>
           </a:xfrm>
           <a:prstGeom prst="roundRect">
             <a:avLst/>
@@ -4344,7 +4251,7 @@
           <a:p>
             <a:pPr algn="ctr"/>
             <a:r>
-              <a:rPr lang="en-US" sz="1100" dirty="0">
+              <a:rPr lang="en-US" sz="1400" dirty="0">
                 <a:solidFill>
                   <a:srgbClr val="459AA3"/>
                 </a:solidFill>
@@ -4368,8 +4275,8 @@
         </p:nvSpPr>
         <p:spPr>
           <a:xfrm>
-            <a:off x="1931976" y="3425698"/>
-            <a:ext cx="743971" cy="177242"/>
+            <a:off x="3136709" y="3382735"/>
+            <a:ext cx="907241" cy="305524"/>
           </a:xfrm>
           <a:prstGeom prst="roundRect">
             <a:avLst/>
@@ -4403,7 +4310,7 @@
           <a:p>
             <a:pPr algn="ctr"/>
             <a:r>
-              <a:rPr lang="en-US" sz="1100" noProof="0" dirty="0">
+              <a:rPr lang="en-US" sz="1400" noProof="0" dirty="0">
                 <a:solidFill>
                   <a:srgbClr val="459AA3"/>
                 </a:solidFill>
@@ -4415,116 +4322,24 @@
       </p:sp>
       <p:cxnSp>
         <p:nvCxnSpPr>
-          <p:cNvPr id="26" name="Curved Connector 25">
-            <a:extLst>
-              <a:ext uri="{FF2B5EF4-FFF2-40B4-BE49-F238E27FC236}">
-                <a16:creationId xmlns:a16="http://schemas.microsoft.com/office/drawing/2014/main" id="{3326B724-6D45-FC63-FBCE-7A2FD9BC2E9C}"/>
+          <p:cNvPr id="47" name="Straight Arrow Connector 46">
+            <a:extLst>
+              <a:ext uri="{FF2B5EF4-FFF2-40B4-BE49-F238E27FC236}">
+                <a16:creationId xmlns:a16="http://schemas.microsoft.com/office/drawing/2014/main" id="{8F07F41D-46DA-ECA2-EDCC-DDDF4BEE64D8}"/>
               </a:ext>
             </a:extLst>
           </p:cNvPr>
           <p:cNvCxnSpPr>
             <a:cxnSpLocks/>
-            <a:stCxn id="4" idx="0"/>
-            <a:endCxn id="15" idx="1"/>
+            <a:stCxn id="18" idx="3"/>
+            <a:endCxn id="4" idx="3"/>
           </p:cNvCxnSpPr>
           <p:nvPr/>
         </p:nvCxnSpPr>
         <p:spPr>
-          <a:xfrm rot="5400000" flipH="1" flipV="1">
-            <a:off x="3674913" y="2464613"/>
-            <a:ext cx="790369" cy="820971"/>
-          </a:xfrm>
-          <a:prstGeom prst="curvedConnector2">
-            <a:avLst/>
-          </a:prstGeom>
-          <a:ln>
-            <a:solidFill>
-              <a:srgbClr val="4B585A"/>
-            </a:solidFill>
-            <a:tailEnd type="triangle"/>
-          </a:ln>
-        </p:spPr>
-        <p:style>
-          <a:lnRef idx="2">
-            <a:schemeClr val="accent1"/>
-          </a:lnRef>
-          <a:fillRef idx="0">
-            <a:schemeClr val="accent1"/>
-          </a:fillRef>
-          <a:effectRef idx="1">
-            <a:schemeClr val="accent1"/>
-          </a:effectRef>
-          <a:fontRef idx="minor">
-            <a:schemeClr val="tx1"/>
-          </a:fontRef>
-        </p:style>
-      </p:cxnSp>
-      <p:cxnSp>
-        <p:nvCxnSpPr>
-          <p:cNvPr id="28" name="Curved Connector 27">
-            <a:extLst>
-              <a:ext uri="{FF2B5EF4-FFF2-40B4-BE49-F238E27FC236}">
-                <a16:creationId xmlns:a16="http://schemas.microsoft.com/office/drawing/2014/main" id="{7D43A1A8-4BEC-2042-88D6-2CA7FD5D81C7}"/>
-              </a:ext>
-            </a:extLst>
-          </p:cNvPr>
-          <p:cNvCxnSpPr>
-            <a:cxnSpLocks/>
-            <a:stCxn id="4" idx="2"/>
-            <a:endCxn id="14" idx="1"/>
-          </p:cNvCxnSpPr>
-          <p:nvPr/>
-        </p:nvCxnSpPr>
-        <p:spPr>
-          <a:xfrm rot="16200000" flipH="1">
-            <a:off x="3439417" y="3978551"/>
-            <a:ext cx="1243687" cy="803297"/>
-          </a:xfrm>
-          <a:prstGeom prst="curvedConnector2">
-            <a:avLst/>
-          </a:prstGeom>
-          <a:ln>
-            <a:solidFill>
-              <a:srgbClr val="4B585A"/>
-            </a:solidFill>
-            <a:tailEnd type="triangle"/>
-          </a:ln>
-        </p:spPr>
-        <p:style>
-          <a:lnRef idx="2">
-            <a:schemeClr val="accent1"/>
-          </a:lnRef>
-          <a:fillRef idx="0">
-            <a:schemeClr val="accent1"/>
-          </a:fillRef>
-          <a:effectRef idx="1">
-            <a:schemeClr val="accent1"/>
-          </a:effectRef>
-          <a:fontRef idx="minor">
-            <a:schemeClr val="tx1"/>
-          </a:fontRef>
-        </p:style>
-      </p:cxnSp>
-      <p:cxnSp>
-        <p:nvCxnSpPr>
-          <p:cNvPr id="35" name="Straight Arrow Connector 34">
-            <a:extLst>
-              <a:ext uri="{FF2B5EF4-FFF2-40B4-BE49-F238E27FC236}">
-                <a16:creationId xmlns:a16="http://schemas.microsoft.com/office/drawing/2014/main" id="{52813B5C-F982-C25C-0657-52ED2E628A90}"/>
-              </a:ext>
-            </a:extLst>
-          </p:cNvPr>
-          <p:cNvCxnSpPr>
-            <a:cxnSpLocks/>
-            <a:stCxn id="4" idx="1"/>
-            <a:endCxn id="16" idx="1"/>
-          </p:cNvCxnSpPr>
-          <p:nvPr/>
-        </p:nvCxnSpPr>
-        <p:spPr>
           <a:xfrm flipV="1">
-            <a:off x="4271291" y="3512943"/>
-            <a:ext cx="191620" cy="1377"/>
+            <a:off x="4043950" y="3533351"/>
+            <a:ext cx="133082" cy="2146"/>
           </a:xfrm>
           <a:prstGeom prst="straightConnector1">
             <a:avLst/>
@@ -4553,32 +4368,34 @@
       </p:cxnSp>
       <p:cxnSp>
         <p:nvCxnSpPr>
-          <p:cNvPr id="41" name="Curved Connector 40">
-            <a:extLst>
-              <a:ext uri="{FF2B5EF4-FFF2-40B4-BE49-F238E27FC236}">
-                <a16:creationId xmlns:a16="http://schemas.microsoft.com/office/drawing/2014/main" id="{70E5AAEE-F935-398A-F528-1E945DC2B764}"/>
+          <p:cNvPr id="59" name="Straight Arrow Connector 58">
+            <a:extLst>
+              <a:ext uri="{FF2B5EF4-FFF2-40B4-BE49-F238E27FC236}">
+                <a16:creationId xmlns:a16="http://schemas.microsoft.com/office/drawing/2014/main" id="{123CFAD0-0CF8-7E0A-C583-D75F8A370BF0}"/>
               </a:ext>
             </a:extLst>
           </p:cNvPr>
           <p:cNvCxnSpPr>
             <a:cxnSpLocks/>
-            <a:stCxn id="15" idx="0"/>
-            <a:endCxn id="11" idx="2"/>
+            <a:stCxn id="15" idx="3"/>
+            <a:endCxn id="67" idx="1"/>
           </p:cNvCxnSpPr>
           <p:nvPr/>
         </p:nvCxnSpPr>
         <p:spPr>
-          <a:xfrm rot="5400000" flipH="1" flipV="1">
-            <a:off x="4557996" y="1953595"/>
-            <a:ext cx="732271" cy="143124"/>
-          </a:xfrm>
-          <a:prstGeom prst="curvedConnector2">
+          <a:xfrm>
+            <a:off x="6782002" y="2626168"/>
+            <a:ext cx="578967" cy="723427"/>
+          </a:xfrm>
+          <a:prstGeom prst="straightConnector1">
             <a:avLst/>
           </a:prstGeom>
           <a:ln>
             <a:solidFill>
               <a:srgbClr val="4B585A"/>
             </a:solidFill>
+            <a:prstDash val="sysDot"/>
+            <a:miter lim="800000"/>
             <a:tailEnd type="triangle"/>
           </a:ln>
         </p:spPr>
@@ -4599,32 +4416,33 @@
       </p:cxnSp>
       <p:cxnSp>
         <p:nvCxnSpPr>
-          <p:cNvPr id="44" name="Curved Connector 43">
-            <a:extLst>
-              <a:ext uri="{FF2B5EF4-FFF2-40B4-BE49-F238E27FC236}">
-                <a16:creationId xmlns:a16="http://schemas.microsoft.com/office/drawing/2014/main" id="{9D08B2E1-5643-EBD3-D4FD-0FD5359B7594}"/>
+          <p:cNvPr id="62" name="Straight Arrow Connector 61">
+            <a:extLst>
+              <a:ext uri="{FF2B5EF4-FFF2-40B4-BE49-F238E27FC236}">
+                <a16:creationId xmlns:a16="http://schemas.microsoft.com/office/drawing/2014/main" id="{DA63AE62-0D8C-ABE3-EBAD-444386B14124}"/>
               </a:ext>
             </a:extLst>
           </p:cNvPr>
           <p:cNvCxnSpPr>
             <a:cxnSpLocks/>
-            <a:stCxn id="11" idx="6"/>
-            <a:endCxn id="17" idx="0"/>
+            <a:stCxn id="16" idx="3"/>
+            <a:endCxn id="67" idx="2"/>
           </p:cNvCxnSpPr>
           <p:nvPr/>
         </p:nvCxnSpPr>
         <p:spPr>
-          <a:xfrm>
-            <a:off x="6291094" y="1659021"/>
-            <a:ext cx="138929" cy="740959"/>
-          </a:xfrm>
-          <a:prstGeom prst="curvedConnector2">
+          <a:xfrm flipV="1">
+            <a:off x="6781396" y="3532764"/>
+            <a:ext cx="503702" cy="586"/>
+          </a:xfrm>
+          <a:prstGeom prst="straightConnector1">
             <a:avLst/>
           </a:prstGeom>
           <a:ln>
             <a:solidFill>
               <a:srgbClr val="4B585A"/>
             </a:solidFill>
+            <a:prstDash val="sysDot"/>
             <a:tailEnd type="triangle"/>
           </a:ln>
         </p:spPr>
@@ -4645,24 +4463,71 @@
       </p:cxnSp>
       <p:cxnSp>
         <p:nvCxnSpPr>
-          <p:cNvPr id="47" name="Straight Arrow Connector 46">
-            <a:extLst>
-              <a:ext uri="{FF2B5EF4-FFF2-40B4-BE49-F238E27FC236}">
-                <a16:creationId xmlns:a16="http://schemas.microsoft.com/office/drawing/2014/main" id="{8F07F41D-46DA-ECA2-EDCC-DDDF4BEE64D8}"/>
+          <p:cNvPr id="66" name="Straight Arrow Connector 65">
+            <a:extLst>
+              <a:ext uri="{FF2B5EF4-FFF2-40B4-BE49-F238E27FC236}">
+                <a16:creationId xmlns:a16="http://schemas.microsoft.com/office/drawing/2014/main" id="{9A249EC1-996D-F44E-FE36-CAF8F5327402}"/>
               </a:ext>
             </a:extLst>
           </p:cNvPr>
           <p:cNvCxnSpPr>
             <a:cxnSpLocks/>
-            <a:stCxn id="18" idx="3"/>
-            <a:endCxn id="4" idx="3"/>
+            <a:stCxn id="17" idx="2"/>
+            <a:endCxn id="67" idx="0"/>
           </p:cNvCxnSpPr>
           <p:nvPr/>
         </p:nvCxnSpPr>
         <p:spPr>
           <a:xfrm>
-            <a:off x="2675947" y="3514319"/>
-            <a:ext cx="371987" cy="1"/>
+            <a:off x="7539317" y="2179191"/>
+            <a:ext cx="4821" cy="1094533"/>
+          </a:xfrm>
+          <a:prstGeom prst="straightConnector1">
+            <a:avLst/>
+          </a:prstGeom>
+          <a:ln>
+            <a:solidFill>
+              <a:srgbClr val="4B585A"/>
+            </a:solidFill>
+            <a:prstDash val="sysDot"/>
+            <a:tailEnd type="triangle"/>
+          </a:ln>
+        </p:spPr>
+        <p:style>
+          <a:lnRef idx="2">
+            <a:schemeClr val="accent1"/>
+          </a:lnRef>
+          <a:fillRef idx="0">
+            <a:schemeClr val="accent1"/>
+          </a:fillRef>
+          <a:effectRef idx="1">
+            <a:schemeClr val="accent1"/>
+          </a:effectRef>
+          <a:fontRef idx="minor">
+            <a:schemeClr val="tx1"/>
+          </a:fontRef>
+        </p:style>
+      </p:cxnSp>
+      <p:cxnSp>
+        <p:nvCxnSpPr>
+          <p:cNvPr id="109" name="Straight Arrow Connector 108">
+            <a:extLst>
+              <a:ext uri="{FF2B5EF4-FFF2-40B4-BE49-F238E27FC236}">
+                <a16:creationId xmlns:a16="http://schemas.microsoft.com/office/drawing/2014/main" id="{3E5ACF47-8F2B-E0EF-1A1B-FE04F9139116}"/>
+              </a:ext>
+            </a:extLst>
+          </p:cNvPr>
+          <p:cNvCxnSpPr>
+            <a:cxnSpLocks/>
+            <a:stCxn id="67" idx="6"/>
+            <a:endCxn id="6" idx="3"/>
+          </p:cNvCxnSpPr>
+          <p:nvPr/>
+        </p:nvCxnSpPr>
+        <p:spPr>
+          <a:xfrm>
+            <a:off x="7803177" y="3532764"/>
+            <a:ext cx="327399" cy="587"/>
           </a:xfrm>
           <a:prstGeom prst="straightConnector1">
             <a:avLst/>
@@ -4691,24 +4556,24 @@
       </p:cxnSp>
       <p:cxnSp>
         <p:nvCxnSpPr>
-          <p:cNvPr id="50" name="Straight Arrow Connector 49">
-            <a:extLst>
-              <a:ext uri="{FF2B5EF4-FFF2-40B4-BE49-F238E27FC236}">
-                <a16:creationId xmlns:a16="http://schemas.microsoft.com/office/drawing/2014/main" id="{940ADAA9-81F6-FD7D-EE1A-526543488676}"/>
+          <p:cNvPr id="122" name="Straight Arrow Connector 121">
+            <a:extLst>
+              <a:ext uri="{FF2B5EF4-FFF2-40B4-BE49-F238E27FC236}">
+                <a16:creationId xmlns:a16="http://schemas.microsoft.com/office/drawing/2014/main" id="{D90E72E5-E58C-CB8D-8110-78A3D62921CF}"/>
               </a:ext>
             </a:extLst>
           </p:cNvPr>
           <p:cNvCxnSpPr>
             <a:cxnSpLocks/>
-            <a:stCxn id="10" idx="4"/>
-            <a:endCxn id="18" idx="0"/>
+            <a:stCxn id="67" idx="6"/>
+            <a:endCxn id="5" idx="3"/>
           </p:cNvCxnSpPr>
           <p:nvPr/>
         </p:nvCxnSpPr>
         <p:spPr>
-          <a:xfrm flipH="1">
-            <a:off x="2303962" y="1903058"/>
-            <a:ext cx="1" cy="1522640"/>
+          <a:xfrm flipV="1">
+            <a:off x="7803177" y="2975176"/>
+            <a:ext cx="327397" cy="557588"/>
           </a:xfrm>
           <a:prstGeom prst="straightConnector1">
             <a:avLst/>
@@ -4735,151 +4600,12 @@
           </a:fontRef>
         </p:style>
       </p:cxnSp>
-      <p:cxnSp>
-        <p:nvCxnSpPr>
-          <p:cNvPr id="59" name="Straight Arrow Connector 58">
-            <a:extLst>
-              <a:ext uri="{FF2B5EF4-FFF2-40B4-BE49-F238E27FC236}">
-                <a16:creationId xmlns:a16="http://schemas.microsoft.com/office/drawing/2014/main" id="{123CFAD0-0CF8-7E0A-C583-D75F8A370BF0}"/>
-              </a:ext>
-            </a:extLst>
-          </p:cNvPr>
-          <p:cNvCxnSpPr>
-            <a:cxnSpLocks/>
-            <a:stCxn id="15" idx="3"/>
-          </p:cNvCxnSpPr>
-          <p:nvPr/>
-        </p:nvCxnSpPr>
-        <p:spPr>
-          <a:xfrm>
-            <a:off x="5224554" y="2479913"/>
-            <a:ext cx="1205467" cy="1029592"/>
-          </a:xfrm>
-          <a:prstGeom prst="straightConnector1">
-            <a:avLst/>
-          </a:prstGeom>
-          <a:ln>
-            <a:solidFill>
-              <a:srgbClr val="4B585A"/>
-            </a:solidFill>
-            <a:prstDash val="dash"/>
-            <a:miter lim="800000"/>
-            <a:tailEnd type="oval"/>
-          </a:ln>
-        </p:spPr>
-        <p:style>
-          <a:lnRef idx="2">
-            <a:schemeClr val="accent1"/>
-          </a:lnRef>
-          <a:fillRef idx="0">
-            <a:schemeClr val="accent1"/>
-          </a:fillRef>
-          <a:effectRef idx="1">
-            <a:schemeClr val="accent1"/>
-          </a:effectRef>
-          <a:fontRef idx="minor">
-            <a:schemeClr val="tx1"/>
-          </a:fontRef>
-        </p:style>
-      </p:cxnSp>
-      <p:cxnSp>
-        <p:nvCxnSpPr>
-          <p:cNvPr id="62" name="Straight Arrow Connector 61">
-            <a:extLst>
-              <a:ext uri="{FF2B5EF4-FFF2-40B4-BE49-F238E27FC236}">
-                <a16:creationId xmlns:a16="http://schemas.microsoft.com/office/drawing/2014/main" id="{DA63AE62-0D8C-ABE3-EBAD-444386B14124}"/>
-              </a:ext>
-            </a:extLst>
-          </p:cNvPr>
-          <p:cNvCxnSpPr>
-            <a:cxnSpLocks/>
-            <a:stCxn id="16" idx="3"/>
-          </p:cNvCxnSpPr>
-          <p:nvPr/>
-        </p:nvCxnSpPr>
-        <p:spPr>
-          <a:xfrm flipV="1">
-            <a:off x="5206882" y="3509505"/>
-            <a:ext cx="1223139" cy="3438"/>
-          </a:xfrm>
-          <a:prstGeom prst="straightConnector1">
-            <a:avLst/>
-          </a:prstGeom>
-          <a:ln>
-            <a:solidFill>
-              <a:srgbClr val="4B585A"/>
-            </a:solidFill>
-            <a:prstDash val="dash"/>
-            <a:tailEnd type="oval"/>
-          </a:ln>
-        </p:spPr>
-        <p:style>
-          <a:lnRef idx="2">
-            <a:schemeClr val="accent1"/>
-          </a:lnRef>
-          <a:fillRef idx="0">
-            <a:schemeClr val="accent1"/>
-          </a:fillRef>
-          <a:effectRef idx="1">
-            <a:schemeClr val="accent1"/>
-          </a:effectRef>
-          <a:fontRef idx="minor">
-            <a:schemeClr val="tx1"/>
-          </a:fontRef>
-        </p:style>
-      </p:cxnSp>
-      <p:cxnSp>
-        <p:nvCxnSpPr>
-          <p:cNvPr id="66" name="Straight Arrow Connector 65">
-            <a:extLst>
-              <a:ext uri="{FF2B5EF4-FFF2-40B4-BE49-F238E27FC236}">
-                <a16:creationId xmlns:a16="http://schemas.microsoft.com/office/drawing/2014/main" id="{9A249EC1-996D-F44E-FE36-CAF8F5327402}"/>
-              </a:ext>
-            </a:extLst>
-          </p:cNvPr>
-          <p:cNvCxnSpPr>
-            <a:cxnSpLocks/>
-            <a:stCxn id="17" idx="2"/>
-          </p:cNvCxnSpPr>
-          <p:nvPr/>
-        </p:nvCxnSpPr>
-        <p:spPr>
-          <a:xfrm>
-            <a:off x="6430023" y="2577222"/>
-            <a:ext cx="0" cy="932283"/>
-          </a:xfrm>
-          <a:prstGeom prst="straightConnector1">
-            <a:avLst/>
-          </a:prstGeom>
-          <a:ln>
-            <a:solidFill>
-              <a:srgbClr val="4B585A"/>
-            </a:solidFill>
-            <a:prstDash val="dash"/>
-            <a:tailEnd type="oval"/>
-          </a:ln>
-        </p:spPr>
-        <p:style>
-          <a:lnRef idx="2">
-            <a:schemeClr val="accent1"/>
-          </a:lnRef>
-          <a:fillRef idx="0">
-            <a:schemeClr val="accent1"/>
-          </a:fillRef>
-          <a:effectRef idx="1">
-            <a:schemeClr val="accent1"/>
-          </a:effectRef>
-          <a:fontRef idx="minor">
-            <a:schemeClr val="tx1"/>
-          </a:fontRef>
-        </p:style>
-      </p:cxnSp>
-      <p:sp>
-        <p:nvSpPr>
-          <p:cNvPr id="73" name="Rounded Rectangle 72">
-            <a:extLst>
-              <a:ext uri="{FF2B5EF4-FFF2-40B4-BE49-F238E27FC236}">
-                <a16:creationId xmlns:a16="http://schemas.microsoft.com/office/drawing/2014/main" id="{AFDD804E-5CC5-F527-5837-B0CE566B8D70}"/>
+      <p:sp>
+        <p:nvSpPr>
+          <p:cNvPr id="228" name="Rectangle 227">
+            <a:extLst>
+              <a:ext uri="{FF2B5EF4-FFF2-40B4-BE49-F238E27FC236}">
+                <a16:creationId xmlns:a16="http://schemas.microsoft.com/office/drawing/2014/main" id="{B991CB48-19CB-E9CD-2FAA-AB241F5CE83C}"/>
               </a:ext>
             </a:extLst>
           </p:cNvPr>
@@ -4888,396 +4614,8 @@
         </p:nvSpPr>
         <p:spPr>
           <a:xfrm>
-            <a:off x="4462909" y="3622741"/>
-            <a:ext cx="743971" cy="177242"/>
-          </a:xfrm>
-          <a:prstGeom prst="roundRect">
-            <a:avLst/>
-          </a:prstGeom>
-          <a:noFill/>
-          <a:ln>
-            <a:noFill/>
-          </a:ln>
-        </p:spPr>
-        <p:style>
-          <a:lnRef idx="2">
-            <a:schemeClr val="accent1">
-              <a:shade val="15000"/>
-            </a:schemeClr>
-          </a:lnRef>
-          <a:fillRef idx="1">
-            <a:schemeClr val="accent1"/>
-          </a:fillRef>
-          <a:effectRef idx="0">
-            <a:schemeClr val="accent1"/>
-          </a:effectRef>
-          <a:fontRef idx="minor">
-            <a:schemeClr val="lt1"/>
-          </a:fontRef>
-        </p:style>
-        <p:txBody>
-          <a:bodyPr rtlCol="0" anchor="ctr"/>
-          <a:lstStyle/>
-          <a:p>
-            <a:pPr algn="ctr"/>
-            <a:r>
-              <a:rPr lang="en-US" sz="1100" i="1" noProof="0" dirty="0">
-                <a:solidFill>
-                  <a:srgbClr val="4B585A"/>
-                </a:solidFill>
-              </a:rPr>
-              <a:t>optional</a:t>
-            </a:r>
-          </a:p>
-        </p:txBody>
-      </p:sp>
-      <p:cxnSp>
-        <p:nvCxnSpPr>
-          <p:cNvPr id="109" name="Straight Arrow Connector 108">
-            <a:extLst>
-              <a:ext uri="{FF2B5EF4-FFF2-40B4-BE49-F238E27FC236}">
-                <a16:creationId xmlns:a16="http://schemas.microsoft.com/office/drawing/2014/main" id="{3E5ACF47-8F2B-E0EF-1A1B-FE04F9139116}"/>
-              </a:ext>
-            </a:extLst>
-          </p:cNvPr>
-          <p:cNvCxnSpPr>
-            <a:cxnSpLocks/>
-            <a:endCxn id="6" idx="3"/>
-          </p:cNvCxnSpPr>
-          <p:nvPr/>
-        </p:nvCxnSpPr>
-        <p:spPr>
-          <a:xfrm>
-            <a:off x="6430021" y="3512943"/>
-            <a:ext cx="906156" cy="0"/>
-          </a:xfrm>
-          <a:prstGeom prst="straightConnector1">
-            <a:avLst/>
-          </a:prstGeom>
-          <a:ln>
-            <a:solidFill>
-              <a:srgbClr val="4B585A"/>
-            </a:solidFill>
-            <a:tailEnd type="triangle"/>
-          </a:ln>
-        </p:spPr>
-        <p:style>
-          <a:lnRef idx="2">
-            <a:schemeClr val="accent1"/>
-          </a:lnRef>
-          <a:fillRef idx="0">
-            <a:schemeClr val="accent1"/>
-          </a:fillRef>
-          <a:effectRef idx="1">
-            <a:schemeClr val="accent1"/>
-          </a:effectRef>
-          <a:fontRef idx="minor">
-            <a:schemeClr val="tx1"/>
-          </a:fontRef>
-        </p:style>
-      </p:cxnSp>
-      <p:cxnSp>
-        <p:nvCxnSpPr>
-          <p:cNvPr id="122" name="Straight Arrow Connector 121">
-            <a:extLst>
-              <a:ext uri="{FF2B5EF4-FFF2-40B4-BE49-F238E27FC236}">
-                <a16:creationId xmlns:a16="http://schemas.microsoft.com/office/drawing/2014/main" id="{D90E72E5-E58C-CB8D-8110-78A3D62921CF}"/>
-              </a:ext>
-            </a:extLst>
-          </p:cNvPr>
-          <p:cNvCxnSpPr>
-            <a:cxnSpLocks/>
-            <a:endCxn id="5" idx="3"/>
-          </p:cNvCxnSpPr>
-          <p:nvPr/>
-        </p:nvCxnSpPr>
-        <p:spPr>
-          <a:xfrm flipV="1">
-            <a:off x="6430021" y="2489978"/>
-            <a:ext cx="906157" cy="1016089"/>
-          </a:xfrm>
-          <a:prstGeom prst="straightConnector1">
-            <a:avLst/>
-          </a:prstGeom>
-          <a:ln>
-            <a:solidFill>
-              <a:srgbClr val="4B585A"/>
-            </a:solidFill>
-            <a:tailEnd type="triangle"/>
-          </a:ln>
-        </p:spPr>
-        <p:style>
-          <a:lnRef idx="2">
-            <a:schemeClr val="accent1"/>
-          </a:lnRef>
-          <a:fillRef idx="0">
-            <a:schemeClr val="accent1"/>
-          </a:fillRef>
-          <a:effectRef idx="1">
-            <a:schemeClr val="accent1"/>
-          </a:effectRef>
-          <a:fontRef idx="minor">
-            <a:schemeClr val="tx1"/>
-          </a:fontRef>
-        </p:style>
-      </p:cxnSp>
-      <p:cxnSp>
-        <p:nvCxnSpPr>
-          <p:cNvPr id="199" name="Straight Arrow Connector 198">
-            <a:extLst>
-              <a:ext uri="{FF2B5EF4-FFF2-40B4-BE49-F238E27FC236}">
-                <a16:creationId xmlns:a16="http://schemas.microsoft.com/office/drawing/2014/main" id="{265230D0-E911-8927-A283-595E116A3956}"/>
-              </a:ext>
-            </a:extLst>
-          </p:cNvPr>
-          <p:cNvCxnSpPr>
-            <a:cxnSpLocks/>
-            <a:stCxn id="5" idx="1"/>
-            <a:endCxn id="22" idx="4"/>
-          </p:cNvCxnSpPr>
-          <p:nvPr/>
-        </p:nvCxnSpPr>
-        <p:spPr>
-          <a:xfrm>
-            <a:off x="8559535" y="2489978"/>
-            <a:ext cx="1023773" cy="1305302"/>
-          </a:xfrm>
-          <a:prstGeom prst="straightConnector1">
-            <a:avLst/>
-          </a:prstGeom>
-          <a:ln>
-            <a:solidFill>
-              <a:srgbClr val="4B585A"/>
-            </a:solidFill>
-            <a:tailEnd type="triangle"/>
-          </a:ln>
-        </p:spPr>
-        <p:style>
-          <a:lnRef idx="2">
-            <a:schemeClr val="accent1"/>
-          </a:lnRef>
-          <a:fillRef idx="0">
-            <a:schemeClr val="accent1"/>
-          </a:fillRef>
-          <a:effectRef idx="1">
-            <a:schemeClr val="accent1"/>
-          </a:effectRef>
-          <a:fontRef idx="minor">
-            <a:schemeClr val="tx1"/>
-          </a:fontRef>
-        </p:style>
-      </p:cxnSp>
-      <p:cxnSp>
-        <p:nvCxnSpPr>
-          <p:cNvPr id="202" name="Straight Arrow Connector 201">
-            <a:extLst>
-              <a:ext uri="{FF2B5EF4-FFF2-40B4-BE49-F238E27FC236}">
-                <a16:creationId xmlns:a16="http://schemas.microsoft.com/office/drawing/2014/main" id="{E8D1D401-240A-5109-0B61-1D7BAF78FAF6}"/>
-              </a:ext>
-            </a:extLst>
-          </p:cNvPr>
-          <p:cNvCxnSpPr>
-            <a:cxnSpLocks/>
-            <a:stCxn id="6" idx="1"/>
-            <a:endCxn id="21" idx="4"/>
-          </p:cNvCxnSpPr>
-          <p:nvPr/>
-        </p:nvCxnSpPr>
-        <p:spPr>
-          <a:xfrm>
-            <a:off x="8559534" y="3512943"/>
-            <a:ext cx="1023774" cy="538961"/>
-          </a:xfrm>
-          <a:prstGeom prst="straightConnector1">
-            <a:avLst/>
-          </a:prstGeom>
-          <a:ln>
-            <a:solidFill>
-              <a:srgbClr val="4B585A"/>
-            </a:solidFill>
-            <a:tailEnd type="triangle"/>
-          </a:ln>
-        </p:spPr>
-        <p:style>
-          <a:lnRef idx="2">
-            <a:schemeClr val="accent1"/>
-          </a:lnRef>
-          <a:fillRef idx="0">
-            <a:schemeClr val="accent1"/>
-          </a:fillRef>
-          <a:effectRef idx="1">
-            <a:schemeClr val="accent1"/>
-          </a:effectRef>
-          <a:fontRef idx="minor">
-            <a:schemeClr val="tx1"/>
-          </a:fontRef>
-        </p:style>
-      </p:cxnSp>
-      <p:cxnSp>
-        <p:nvCxnSpPr>
-          <p:cNvPr id="205" name="Straight Arrow Connector 204">
-            <a:extLst>
-              <a:ext uri="{FF2B5EF4-FFF2-40B4-BE49-F238E27FC236}">
-                <a16:creationId xmlns:a16="http://schemas.microsoft.com/office/drawing/2014/main" id="{9C6AB496-FB3E-138B-D91B-0758A8EC0EAB}"/>
-              </a:ext>
-            </a:extLst>
-          </p:cNvPr>
-          <p:cNvCxnSpPr>
-            <a:cxnSpLocks/>
-            <a:stCxn id="7" idx="1"/>
-            <a:endCxn id="29" idx="4"/>
-          </p:cNvCxnSpPr>
-          <p:nvPr/>
-        </p:nvCxnSpPr>
-        <p:spPr>
-          <a:xfrm>
-            <a:off x="8559534" y="4535908"/>
-            <a:ext cx="1023774" cy="2329"/>
-          </a:xfrm>
-          <a:prstGeom prst="straightConnector1">
-            <a:avLst/>
-          </a:prstGeom>
-          <a:ln>
-            <a:solidFill>
-              <a:srgbClr val="4B585A"/>
-            </a:solidFill>
-            <a:tailEnd type="triangle"/>
-          </a:ln>
-        </p:spPr>
-        <p:style>
-          <a:lnRef idx="2">
-            <a:schemeClr val="accent1"/>
-          </a:lnRef>
-          <a:fillRef idx="0">
-            <a:schemeClr val="accent1"/>
-          </a:fillRef>
-          <a:effectRef idx="1">
-            <a:schemeClr val="accent1"/>
-          </a:effectRef>
-          <a:fontRef idx="minor">
-            <a:schemeClr val="tx1"/>
-          </a:fontRef>
-        </p:style>
-      </p:cxnSp>
-      <p:cxnSp>
-        <p:nvCxnSpPr>
-          <p:cNvPr id="208" name="Straight Arrow Connector 207">
-            <a:extLst>
-              <a:ext uri="{FF2B5EF4-FFF2-40B4-BE49-F238E27FC236}">
-                <a16:creationId xmlns:a16="http://schemas.microsoft.com/office/drawing/2014/main" id="{8A56D517-FFC0-609B-9387-92FB278A24C6}"/>
-              </a:ext>
-            </a:extLst>
-          </p:cNvPr>
-          <p:cNvCxnSpPr>
-            <a:cxnSpLocks/>
-            <a:stCxn id="14" idx="3"/>
-            <a:endCxn id="19" idx="4"/>
-          </p:cNvCxnSpPr>
-          <p:nvPr/>
-        </p:nvCxnSpPr>
-        <p:spPr>
-          <a:xfrm>
-            <a:off x="5206880" y="5002044"/>
-            <a:ext cx="4376428" cy="7635"/>
-          </a:xfrm>
-          <a:prstGeom prst="straightConnector1">
-            <a:avLst/>
-          </a:prstGeom>
-          <a:ln>
-            <a:solidFill>
-              <a:srgbClr val="4B585A"/>
-            </a:solidFill>
-            <a:tailEnd type="triangle"/>
-          </a:ln>
-        </p:spPr>
-        <p:style>
-          <a:lnRef idx="2">
-            <a:schemeClr val="accent1"/>
-          </a:lnRef>
-          <a:fillRef idx="0">
-            <a:schemeClr val="accent1"/>
-          </a:fillRef>
-          <a:effectRef idx="1">
-            <a:schemeClr val="accent1"/>
-          </a:effectRef>
-          <a:fontRef idx="minor">
-            <a:schemeClr val="tx1"/>
-          </a:fontRef>
-        </p:style>
-      </p:cxnSp>
-      <p:sp>
-        <p:nvSpPr>
-          <p:cNvPr id="226" name="Rounded Rectangle 225">
-            <a:extLst>
-              <a:ext uri="{FF2B5EF4-FFF2-40B4-BE49-F238E27FC236}">
-                <a16:creationId xmlns:a16="http://schemas.microsoft.com/office/drawing/2014/main" id="{CCFB86BF-AC43-3AB7-1535-04CA31F91308}"/>
-              </a:ext>
-            </a:extLst>
-          </p:cNvPr>
-          <p:cNvSpPr/>
-          <p:nvPr/>
-        </p:nvSpPr>
-        <p:spPr>
-          <a:xfrm>
-            <a:off x="4462908" y="5110358"/>
-            <a:ext cx="743971" cy="177242"/>
-          </a:xfrm>
-          <a:prstGeom prst="roundRect">
-            <a:avLst/>
-          </a:prstGeom>
-          <a:noFill/>
-          <a:ln>
-            <a:noFill/>
-          </a:ln>
-        </p:spPr>
-        <p:style>
-          <a:lnRef idx="2">
-            <a:schemeClr val="accent1">
-              <a:shade val="15000"/>
-            </a:schemeClr>
-          </a:lnRef>
-          <a:fillRef idx="1">
-            <a:schemeClr val="accent1"/>
-          </a:fillRef>
-          <a:effectRef idx="0">
-            <a:schemeClr val="accent1"/>
-          </a:effectRef>
-          <a:fontRef idx="minor">
-            <a:schemeClr val="lt1"/>
-          </a:fontRef>
-        </p:style>
-        <p:txBody>
-          <a:bodyPr rtlCol="0" anchor="ctr"/>
-          <a:lstStyle/>
-          <a:p>
-            <a:pPr algn="ctr"/>
-            <a:r>
-              <a:rPr lang="en-US" sz="1100" i="1" noProof="0" dirty="0">
-                <a:solidFill>
-                  <a:srgbClr val="4B585A"/>
-                </a:solidFill>
-              </a:rPr>
-              <a:t>optional</a:t>
-            </a:r>
-          </a:p>
-        </p:txBody>
-      </p:sp>
-      <p:sp>
-        <p:nvSpPr>
-          <p:cNvPr id="228" name="Rectangle 227">
-            <a:extLst>
-              <a:ext uri="{FF2B5EF4-FFF2-40B4-BE49-F238E27FC236}">
-                <a16:creationId xmlns:a16="http://schemas.microsoft.com/office/drawing/2014/main" id="{B991CB48-19CB-E9CD-2FAA-AB241F5CE83C}"/>
-              </a:ext>
-            </a:extLst>
-          </p:cNvPr>
-          <p:cNvSpPr/>
-          <p:nvPr/>
-        </p:nvSpPr>
-        <p:spPr>
-          <a:xfrm>
-            <a:off x="1288747" y="1102670"/>
-            <a:ext cx="7743652" cy="4464828"/>
+            <a:off x="1816477" y="1674451"/>
+            <a:ext cx="7936331" cy="3232301"/>
           </a:xfrm>
           <a:prstGeom prst="rect">
             <a:avLst/>
@@ -5329,10 +4667,10 @@
         </p:nvGrpSpPr>
         <p:grpSpPr>
           <a:xfrm>
-            <a:off x="1288747" y="723446"/>
-            <a:ext cx="7743652" cy="377756"/>
-            <a:chOff x="1288747" y="654370"/>
-            <a:chExt cx="7743652" cy="377756"/>
+            <a:off x="1816477" y="1260489"/>
+            <a:ext cx="7936331" cy="413498"/>
+            <a:chOff x="1288745" y="654370"/>
+            <a:chExt cx="7936331" cy="413498"/>
           </a:xfrm>
         </p:grpSpPr>
         <p:sp>
@@ -5349,8 +4687,8 @@
           </p:nvSpPr>
           <p:spPr>
             <a:xfrm>
-              <a:off x="1288747" y="654743"/>
-              <a:ext cx="7743652" cy="377383"/>
+              <a:off x="1288745" y="654744"/>
+              <a:ext cx="7936331" cy="413124"/>
             </a:xfrm>
             <a:prstGeom prst="rect">
               <a:avLst/>
@@ -5418,8 +4756,8 @@
           </p:blipFill>
           <p:spPr bwMode="auto">
             <a:xfrm>
-              <a:off x="1378374" y="692147"/>
-              <a:ext cx="277888" cy="309003"/>
+              <a:off x="1350853" y="683861"/>
+              <a:ext cx="330357" cy="367348"/>
             </a:xfrm>
             <a:prstGeom prst="rect">
               <a:avLst/>
@@ -5450,8 +4788,8 @@
           </p:nvSpPr>
           <p:spPr>
             <a:xfrm>
-              <a:off x="1517318" y="654370"/>
-              <a:ext cx="1295401" cy="377383"/>
+              <a:off x="1623396" y="654370"/>
+              <a:ext cx="1808629" cy="413497"/>
             </a:xfrm>
             <a:prstGeom prst="roundRect">
               <a:avLst/>
@@ -5481,9 +4819,8 @@
             <a:bodyPr rtlCol="0" anchor="ctr"/>
             <a:lstStyle/>
             <a:p>
-              <a:pPr algn="ctr"/>
               <a:r>
-                <a:rPr lang="en-US" sz="1100" noProof="0" dirty="0">
+                <a:rPr lang="en-US" sz="1400" noProof="0" dirty="0">
                   <a:solidFill>
                     <a:schemeClr val="bg1"/>
                   </a:solidFill>
@@ -5505,14 +4842,15 @@
           </p:cNvPr>
           <p:cNvCxnSpPr>
             <a:cxnSpLocks/>
+            <a:stCxn id="67" idx="6"/>
             <a:endCxn id="7" idx="3"/>
           </p:cNvCxnSpPr>
           <p:nvPr/>
         </p:nvCxnSpPr>
         <p:spPr>
           <a:xfrm>
-            <a:off x="6430021" y="3512943"/>
-            <a:ext cx="906156" cy="1022965"/>
+            <a:off x="7803177" y="3532764"/>
+            <a:ext cx="327399" cy="568502"/>
           </a:xfrm>
           <a:prstGeom prst="straightConnector1">
             <a:avLst/>
@@ -5553,8 +4891,8 @@
         </p:nvGrpSpPr>
         <p:grpSpPr>
           <a:xfrm>
-            <a:off x="9583308" y="3138795"/>
-            <a:ext cx="1315920" cy="2032180"/>
+            <a:off x="9907899" y="2268636"/>
+            <a:ext cx="1315920" cy="2357852"/>
             <a:chOff x="9583308" y="3138795"/>
             <a:chExt cx="1071230" cy="2032180"/>
           </a:xfrm>
@@ -5608,7 +4946,7 @@
             <a:p>
               <a:pPr algn="ctr"/>
               <a:r>
-                <a:rPr lang="en-US" sz="1100" noProof="0" dirty="0"/>
+                <a:rPr lang="en-US" sz="1400" noProof="0" dirty="0"/>
                 <a:t>identifier</a:t>
               </a:r>
             </a:p>
@@ -5683,7 +5021,7 @@
               <a:p>
                 <a:pPr algn="ctr"/>
                 <a:r>
-                  <a:rPr lang="en-US" sz="1100" noProof="0" dirty="0"/>
+                  <a:rPr lang="en-US" sz="1400" noProof="0" dirty="0"/>
                   <a:t>pred</a:t>
                 </a:r>
               </a:p>
@@ -5738,7 +5076,7 @@
               <a:p>
                 <a:pPr algn="ctr"/>
                 <a:r>
-                  <a:rPr lang="en-US" sz="1100" noProof="0" dirty="0"/>
+                  <a:rPr lang="en-US" sz="1400" noProof="0" dirty="0"/>
                   <a:t>target</a:t>
                 </a:r>
               </a:p>
@@ -5793,7 +5131,7 @@
               <a:p>
                 <a:pPr algn="ctr"/>
                 <a:r>
-                  <a:rPr lang="en-US" sz="1100" noProof="0" dirty="0"/>
+                  <a:rPr lang="en-US" sz="1400" noProof="0" dirty="0"/>
                   <a:t>input</a:t>
                 </a:r>
               </a:p>
@@ -5849,7 +5187,7 @@
             <a:p>
               <a:pPr algn="ctr"/>
               <a:r>
-                <a:rPr lang="en-US" sz="1100" noProof="0" dirty="0"/>
+                <a:rPr lang="en-US" sz="1400" noProof="0" dirty="0"/>
                 <a:t>metrics</a:t>
               </a:r>
             </a:p>
@@ -5904,7 +5242,7 @@
             <a:p>
               <a:pPr algn="ctr"/>
               <a:r>
-                <a:rPr lang="en-US" sz="1100" noProof="0" dirty="0"/>
+                <a:rPr lang="en-US" sz="1400" noProof="0" dirty="0"/>
                 <a:t>loss</a:t>
               </a:r>
             </a:p>
@@ -5979,7 +5317,7 @@
               <a:p>
                 <a:pPr algn="ctr"/>
                 <a:r>
-                  <a:rPr lang="en-US" sz="1100" noProof="0" dirty="0"/>
+                  <a:rPr lang="en-US" sz="1400" noProof="0" dirty="0"/>
                   <a:t>step #</a:t>
                 </a:r>
               </a:p>
@@ -6034,7 +5372,7 @@
               <a:p>
                 <a:pPr algn="ctr"/>
                 <a:r>
-                  <a:rPr lang="en-US" sz="1100" noProof="0" dirty="0"/>
+                  <a:rPr lang="en-US" sz="1400" noProof="0" dirty="0"/>
                   <a:t>epoch #</a:t>
                 </a:r>
               </a:p>
@@ -6056,8 +5394,8 @@
         </p:nvSpPr>
         <p:spPr>
           <a:xfrm>
-            <a:off x="9583307" y="2698346"/>
-            <a:ext cx="1315920" cy="322592"/>
+            <a:off x="9785930" y="1764264"/>
+            <a:ext cx="1559859" cy="437462"/>
           </a:xfrm>
           <a:prstGeom prst="roundRect">
             <a:avLst/>
@@ -6089,7 +5427,7 @@
           <a:p>
             <a:pPr algn="ctr"/>
             <a:r>
-              <a:rPr lang="en-US" sz="1100" i="1" noProof="0" dirty="0">
+              <a:rPr lang="en-US" sz="1400" i="1" noProof="0" dirty="0">
                 <a:solidFill>
                   <a:srgbClr val="4B585A"/>
                 </a:solidFill>
@@ -6097,7 +5435,7 @@
               <a:t>Return to Trainer and </a:t>
             </a:r>
             <a:r>
-              <a:rPr lang="en-US" sz="1100" i="1" dirty="0">
+              <a:rPr lang="en-US" sz="1400" i="1" dirty="0">
                 <a:solidFill>
                   <a:srgbClr val="4B585A"/>
                 </a:solidFill>
@@ -6105,12 +5443,772 @@
               <a:t>its</a:t>
             </a:r>
             <a:r>
-              <a:rPr lang="en-US" sz="1100" i="1" noProof="0" dirty="0">
+              <a:rPr lang="en-US" sz="1400" i="1" noProof="0" dirty="0">
                 <a:solidFill>
                   <a:srgbClr val="4B585A"/>
                 </a:solidFill>
               </a:rPr>
               <a:t> Callbacks</a:t>
+            </a:r>
+          </a:p>
+        </p:txBody>
+      </p:sp>
+      <p:sp>
+        <p:nvSpPr>
+          <p:cNvPr id="67" name="Summing Junction 66">
+            <a:extLst>
+              <a:ext uri="{FF2B5EF4-FFF2-40B4-BE49-F238E27FC236}">
+                <a16:creationId xmlns:a16="http://schemas.microsoft.com/office/drawing/2014/main" id="{8DCE0DB6-692C-ECB5-5994-CF5AD1211521}"/>
+              </a:ext>
+            </a:extLst>
+          </p:cNvPr>
+          <p:cNvSpPr/>
+          <p:nvPr/>
+        </p:nvSpPr>
+        <p:spPr>
+          <a:xfrm>
+            <a:off x="7285098" y="3273724"/>
+            <a:ext cx="518079" cy="518079"/>
+          </a:xfrm>
+          <a:prstGeom prst="flowChartSummingJunction">
+            <a:avLst/>
+          </a:prstGeom>
+          <a:solidFill>
+            <a:schemeClr val="bg1"/>
+          </a:solidFill>
+          <a:ln>
+            <a:solidFill>
+              <a:srgbClr val="459AA3"/>
+            </a:solidFill>
+          </a:ln>
+        </p:spPr>
+        <p:style>
+          <a:lnRef idx="2">
+            <a:schemeClr val="accent1">
+              <a:shade val="15000"/>
+            </a:schemeClr>
+          </a:lnRef>
+          <a:fillRef idx="1">
+            <a:schemeClr val="accent1"/>
+          </a:fillRef>
+          <a:effectRef idx="0">
+            <a:schemeClr val="accent1"/>
+          </a:effectRef>
+          <a:fontRef idx="minor">
+            <a:schemeClr val="lt1"/>
+          </a:fontRef>
+        </p:style>
+        <p:txBody>
+          <a:bodyPr rtlCol="0" anchor="ctr"/>
+          <a:lstStyle/>
+          <a:p>
+            <a:pPr algn="ctr"/>
+            <a:endParaRPr lang="en-US"/>
+          </a:p>
+        </p:txBody>
+      </p:sp>
+      <p:cxnSp>
+        <p:nvCxnSpPr>
+          <p:cNvPr id="83" name="Straight Arrow Connector 82">
+            <a:extLst>
+              <a:ext uri="{FF2B5EF4-FFF2-40B4-BE49-F238E27FC236}">
+                <a16:creationId xmlns:a16="http://schemas.microsoft.com/office/drawing/2014/main" id="{8171A15E-0541-71F4-068D-AE377759C85D}"/>
+              </a:ext>
+            </a:extLst>
+          </p:cNvPr>
+          <p:cNvCxnSpPr>
+            <a:cxnSpLocks/>
+            <a:stCxn id="15" idx="0"/>
+            <a:endCxn id="1202" idx="2"/>
+          </p:cNvCxnSpPr>
+          <p:nvPr/>
+        </p:nvCxnSpPr>
+        <p:spPr>
+          <a:xfrm flipH="1" flipV="1">
+            <a:off x="6325473" y="2283712"/>
+            <a:ext cx="2909" cy="189694"/>
+          </a:xfrm>
+          <a:prstGeom prst="straightConnector1">
+            <a:avLst/>
+          </a:prstGeom>
+          <a:ln>
+            <a:solidFill>
+              <a:srgbClr val="4B585A"/>
+            </a:solidFill>
+            <a:tailEnd type="triangle"/>
+          </a:ln>
+        </p:spPr>
+        <p:style>
+          <a:lnRef idx="2">
+            <a:schemeClr val="accent1"/>
+          </a:lnRef>
+          <a:fillRef idx="0">
+            <a:schemeClr val="accent1"/>
+          </a:fillRef>
+          <a:effectRef idx="1">
+            <a:schemeClr val="accent1"/>
+          </a:effectRef>
+          <a:fontRef idx="minor">
+            <a:schemeClr val="tx1"/>
+          </a:fontRef>
+        </p:style>
+      </p:cxnSp>
+      <p:cxnSp>
+        <p:nvCxnSpPr>
+          <p:cNvPr id="88" name="Straight Arrow Connector 87">
+            <a:extLst>
+              <a:ext uri="{FF2B5EF4-FFF2-40B4-BE49-F238E27FC236}">
+                <a16:creationId xmlns:a16="http://schemas.microsoft.com/office/drawing/2014/main" id="{A77F0F33-65DA-2959-8A16-BEA364B1A87F}"/>
+              </a:ext>
+            </a:extLst>
+          </p:cNvPr>
+          <p:cNvCxnSpPr>
+            <a:cxnSpLocks/>
+            <a:stCxn id="1202" idx="1"/>
+            <a:endCxn id="17" idx="1"/>
+          </p:cNvCxnSpPr>
+          <p:nvPr/>
+        </p:nvCxnSpPr>
+        <p:spPr>
+          <a:xfrm flipV="1">
+            <a:off x="6874289" y="2026429"/>
+            <a:ext cx="211407" cy="1"/>
+          </a:xfrm>
+          <a:prstGeom prst="straightConnector1">
+            <a:avLst/>
+          </a:prstGeom>
+          <a:ln>
+            <a:solidFill>
+              <a:srgbClr val="4B585A"/>
+            </a:solidFill>
+            <a:tailEnd type="triangle"/>
+          </a:ln>
+        </p:spPr>
+        <p:style>
+          <a:lnRef idx="2">
+            <a:schemeClr val="accent1"/>
+          </a:lnRef>
+          <a:fillRef idx="0">
+            <a:schemeClr val="accent1"/>
+          </a:fillRef>
+          <a:effectRef idx="1">
+            <a:schemeClr val="accent1"/>
+          </a:effectRef>
+          <a:fontRef idx="minor">
+            <a:schemeClr val="tx1"/>
+          </a:fontRef>
+        </p:style>
+      </p:cxnSp>
+      <p:cxnSp>
+        <p:nvCxnSpPr>
+          <p:cNvPr id="1024" name="Straight Arrow Connector 1023">
+            <a:extLst>
+              <a:ext uri="{FF2B5EF4-FFF2-40B4-BE49-F238E27FC236}">
+                <a16:creationId xmlns:a16="http://schemas.microsoft.com/office/drawing/2014/main" id="{BB558CDE-5ACB-08C8-7088-FA8142A6621F}"/>
+              </a:ext>
+            </a:extLst>
+          </p:cNvPr>
+          <p:cNvCxnSpPr>
+            <a:cxnSpLocks/>
+            <a:stCxn id="4" idx="1"/>
+            <a:endCxn id="15" idx="1"/>
+          </p:cNvCxnSpPr>
+          <p:nvPr/>
+        </p:nvCxnSpPr>
+        <p:spPr>
+          <a:xfrm flipV="1">
+            <a:off x="5679161" y="2626168"/>
+            <a:ext cx="195600" cy="907183"/>
+          </a:xfrm>
+          <a:prstGeom prst="straightConnector1">
+            <a:avLst/>
+          </a:prstGeom>
+          <a:ln>
+            <a:solidFill>
+              <a:srgbClr val="4B585A"/>
+            </a:solidFill>
+            <a:tailEnd type="triangle"/>
+          </a:ln>
+        </p:spPr>
+        <p:style>
+          <a:lnRef idx="2">
+            <a:schemeClr val="accent1"/>
+          </a:lnRef>
+          <a:fillRef idx="0">
+            <a:schemeClr val="accent1"/>
+          </a:fillRef>
+          <a:effectRef idx="1">
+            <a:schemeClr val="accent1"/>
+          </a:effectRef>
+          <a:fontRef idx="minor">
+            <a:schemeClr val="tx1"/>
+          </a:fontRef>
+        </p:style>
+      </p:cxnSp>
+      <p:cxnSp>
+        <p:nvCxnSpPr>
+          <p:cNvPr id="1028" name="Straight Arrow Connector 1027">
+            <a:extLst>
+              <a:ext uri="{FF2B5EF4-FFF2-40B4-BE49-F238E27FC236}">
+                <a16:creationId xmlns:a16="http://schemas.microsoft.com/office/drawing/2014/main" id="{9838CEAD-C21F-862E-9768-A6E0CE16A65F}"/>
+              </a:ext>
+            </a:extLst>
+          </p:cNvPr>
+          <p:cNvCxnSpPr>
+            <a:cxnSpLocks/>
+            <a:stCxn id="4" idx="1"/>
+            <a:endCxn id="16" idx="1"/>
+          </p:cNvCxnSpPr>
+          <p:nvPr/>
+        </p:nvCxnSpPr>
+        <p:spPr>
+          <a:xfrm flipV="1">
+            <a:off x="5679161" y="3533350"/>
+            <a:ext cx="194994" cy="1"/>
+          </a:xfrm>
+          <a:prstGeom prst="straightConnector1">
+            <a:avLst/>
+          </a:prstGeom>
+          <a:ln>
+            <a:solidFill>
+              <a:srgbClr val="4B585A"/>
+            </a:solidFill>
+            <a:tailEnd type="triangle"/>
+          </a:ln>
+        </p:spPr>
+        <p:style>
+          <a:lnRef idx="2">
+            <a:schemeClr val="accent1"/>
+          </a:lnRef>
+          <a:fillRef idx="0">
+            <a:schemeClr val="accent1"/>
+          </a:fillRef>
+          <a:effectRef idx="1">
+            <a:schemeClr val="accent1"/>
+          </a:effectRef>
+          <a:fontRef idx="minor">
+            <a:schemeClr val="tx1"/>
+          </a:fontRef>
+        </p:style>
+      </p:cxnSp>
+      <p:cxnSp>
+        <p:nvCxnSpPr>
+          <p:cNvPr id="1031" name="Straight Arrow Connector 1030">
+            <a:extLst>
+              <a:ext uri="{FF2B5EF4-FFF2-40B4-BE49-F238E27FC236}">
+                <a16:creationId xmlns:a16="http://schemas.microsoft.com/office/drawing/2014/main" id="{E6D7D24E-288E-8EAB-AEBC-D4374B5362BF}"/>
+              </a:ext>
+            </a:extLst>
+          </p:cNvPr>
+          <p:cNvCxnSpPr>
+            <a:cxnSpLocks/>
+            <a:stCxn id="4" idx="1"/>
+            <a:endCxn id="14" idx="1"/>
+          </p:cNvCxnSpPr>
+          <p:nvPr/>
+        </p:nvCxnSpPr>
+        <p:spPr>
+          <a:xfrm>
+            <a:off x="5679161" y="3533351"/>
+            <a:ext cx="216562" cy="910227"/>
+          </a:xfrm>
+          <a:prstGeom prst="straightConnector1">
+            <a:avLst/>
+          </a:prstGeom>
+          <a:ln>
+            <a:solidFill>
+              <a:srgbClr val="4B585A"/>
+            </a:solidFill>
+            <a:tailEnd type="triangle"/>
+          </a:ln>
+        </p:spPr>
+        <p:style>
+          <a:lnRef idx="2">
+            <a:schemeClr val="accent1"/>
+          </a:lnRef>
+          <a:fillRef idx="0">
+            <a:schemeClr val="accent1"/>
+          </a:fillRef>
+          <a:effectRef idx="1">
+            <a:schemeClr val="accent1"/>
+          </a:effectRef>
+          <a:fontRef idx="minor">
+            <a:schemeClr val="tx1"/>
+          </a:fontRef>
+        </p:style>
+      </p:cxnSp>
+      <p:sp>
+        <p:nvSpPr>
+          <p:cNvPr id="1201" name="Rectangle 1200">
+            <a:extLst>
+              <a:ext uri="{FF2B5EF4-FFF2-40B4-BE49-F238E27FC236}">
+                <a16:creationId xmlns:a16="http://schemas.microsoft.com/office/drawing/2014/main" id="{BC5BCE0A-5DA5-F490-719F-A18144FC867E}"/>
+              </a:ext>
+            </a:extLst>
+          </p:cNvPr>
+          <p:cNvSpPr/>
+          <p:nvPr/>
+        </p:nvSpPr>
+        <p:spPr>
+          <a:xfrm flipH="1">
+            <a:off x="1902461" y="3277238"/>
+            <a:ext cx="1097633" cy="514565"/>
+          </a:xfrm>
+          <a:prstGeom prst="rect">
+            <a:avLst/>
+          </a:prstGeom>
+          <a:solidFill>
+            <a:srgbClr val="4B585A"/>
+          </a:solidFill>
+          <a:ln>
+            <a:noFill/>
+          </a:ln>
+        </p:spPr>
+        <p:style>
+          <a:lnRef idx="2">
+            <a:schemeClr val="accent1">
+              <a:shade val="15000"/>
+            </a:schemeClr>
+          </a:lnRef>
+          <a:fillRef idx="1">
+            <a:schemeClr val="accent1"/>
+          </a:fillRef>
+          <a:effectRef idx="0">
+            <a:schemeClr val="accent1"/>
+          </a:effectRef>
+          <a:fontRef idx="minor">
+            <a:schemeClr val="lt1"/>
+          </a:fontRef>
+        </p:style>
+        <p:txBody>
+          <a:bodyPr rtlCol="0" anchor="ctr"/>
+          <a:lstStyle/>
+          <a:p>
+            <a:pPr algn="ctr"/>
+            <a:r>
+              <a:rPr lang="en-US" sz="1400" noProof="0" dirty="0">
+                <a:solidFill>
+                  <a:schemeClr val="bg1"/>
+                </a:solidFill>
+              </a:rPr>
+              <a:t>DataLoader</a:t>
+            </a:r>
+            <a:endParaRPr lang="en-US" sz="1200" noProof="0" dirty="0">
+              <a:solidFill>
+                <a:schemeClr val="bg1"/>
+              </a:solidFill>
+            </a:endParaRPr>
+          </a:p>
+        </p:txBody>
+      </p:sp>
+      <p:sp>
+        <p:nvSpPr>
+          <p:cNvPr id="1202" name="Rectangle 1201">
+            <a:extLst>
+              <a:ext uri="{FF2B5EF4-FFF2-40B4-BE49-F238E27FC236}">
+                <a16:creationId xmlns:a16="http://schemas.microsoft.com/office/drawing/2014/main" id="{74772815-B142-9429-E231-EA5721270966}"/>
+              </a:ext>
+            </a:extLst>
+          </p:cNvPr>
+          <p:cNvSpPr/>
+          <p:nvPr/>
+        </p:nvSpPr>
+        <p:spPr>
+          <a:xfrm flipH="1">
+            <a:off x="5776658" y="1769147"/>
+            <a:ext cx="1097631" cy="514565"/>
+          </a:xfrm>
+          <a:prstGeom prst="rect">
+            <a:avLst/>
+          </a:prstGeom>
+          <a:solidFill>
+            <a:srgbClr val="4B585A"/>
+          </a:solidFill>
+          <a:ln>
+            <a:noFill/>
+          </a:ln>
+        </p:spPr>
+        <p:style>
+          <a:lnRef idx="2">
+            <a:schemeClr val="accent1">
+              <a:shade val="15000"/>
+            </a:schemeClr>
+          </a:lnRef>
+          <a:fillRef idx="1">
+            <a:schemeClr val="accent1"/>
+          </a:fillRef>
+          <a:effectRef idx="0">
+            <a:schemeClr val="accent1"/>
+          </a:effectRef>
+          <a:fontRef idx="minor">
+            <a:schemeClr val="lt1"/>
+          </a:fontRef>
+        </p:style>
+        <p:txBody>
+          <a:bodyPr rtlCol="0" anchor="ctr"/>
+          <a:lstStyle/>
+          <a:p>
+            <a:pPr algn="ctr"/>
+            <a:r>
+              <a:rPr lang="en-US" sz="1400" noProof="0" dirty="0">
+                <a:solidFill>
+                  <a:schemeClr val="bg1"/>
+                </a:solidFill>
+              </a:rPr>
+              <a:t>Model</a:t>
+            </a:r>
+            <a:endParaRPr lang="en-US" sz="1100" noProof="0" dirty="0">
+              <a:solidFill>
+                <a:schemeClr val="bg1"/>
+              </a:solidFill>
+            </a:endParaRPr>
+          </a:p>
+        </p:txBody>
+      </p:sp>
+      <p:cxnSp>
+        <p:nvCxnSpPr>
+          <p:cNvPr id="1238" name="Straight Arrow Connector 1237">
+            <a:extLst>
+              <a:ext uri="{FF2B5EF4-FFF2-40B4-BE49-F238E27FC236}">
+                <a16:creationId xmlns:a16="http://schemas.microsoft.com/office/drawing/2014/main" id="{D539CE67-4B63-7E23-1368-4DB2DE3594C1}"/>
+              </a:ext>
+            </a:extLst>
+          </p:cNvPr>
+          <p:cNvCxnSpPr>
+            <a:cxnSpLocks/>
+            <a:stCxn id="1201" idx="1"/>
+            <a:endCxn id="18" idx="1"/>
+          </p:cNvCxnSpPr>
+          <p:nvPr/>
+        </p:nvCxnSpPr>
+        <p:spPr>
+          <a:xfrm>
+            <a:off x="3000094" y="3534521"/>
+            <a:ext cx="136615" cy="976"/>
+          </a:xfrm>
+          <a:prstGeom prst="straightConnector1">
+            <a:avLst/>
+          </a:prstGeom>
+          <a:ln>
+            <a:solidFill>
+              <a:srgbClr val="4B585A"/>
+            </a:solidFill>
+            <a:tailEnd type="triangle"/>
+          </a:ln>
+        </p:spPr>
+        <p:style>
+          <a:lnRef idx="2">
+            <a:schemeClr val="accent1"/>
+          </a:lnRef>
+          <a:fillRef idx="0">
+            <a:schemeClr val="accent1"/>
+          </a:fillRef>
+          <a:effectRef idx="1">
+            <a:schemeClr val="accent1"/>
+          </a:effectRef>
+          <a:fontRef idx="minor">
+            <a:schemeClr val="tx1"/>
+          </a:fontRef>
+        </p:style>
+      </p:cxnSp>
+      <p:sp>
+        <p:nvSpPr>
+          <p:cNvPr id="1333" name="Rounded Rectangle 1332">
+            <a:extLst>
+              <a:ext uri="{FF2B5EF4-FFF2-40B4-BE49-F238E27FC236}">
+                <a16:creationId xmlns:a16="http://schemas.microsoft.com/office/drawing/2014/main" id="{587BFCF7-D885-33FF-6B98-2FF9D34C9439}"/>
+              </a:ext>
+            </a:extLst>
+          </p:cNvPr>
+          <p:cNvSpPr/>
+          <p:nvPr/>
+        </p:nvSpPr>
+        <p:spPr>
+          <a:xfrm>
+            <a:off x="5874154" y="3701666"/>
+            <a:ext cx="907241" cy="236836"/>
+          </a:xfrm>
+          <a:prstGeom prst="roundRect">
+            <a:avLst/>
+          </a:prstGeom>
+          <a:noFill/>
+          <a:ln>
+            <a:noFill/>
+          </a:ln>
+        </p:spPr>
+        <p:style>
+          <a:lnRef idx="2">
+            <a:schemeClr val="accent1">
+              <a:shade val="15000"/>
+            </a:schemeClr>
+          </a:lnRef>
+          <a:fillRef idx="1">
+            <a:schemeClr val="accent1"/>
+          </a:fillRef>
+          <a:effectRef idx="0">
+            <a:schemeClr val="accent1"/>
+          </a:effectRef>
+          <a:fontRef idx="minor">
+            <a:schemeClr val="lt1"/>
+          </a:fontRef>
+        </p:style>
+        <p:txBody>
+          <a:bodyPr rtlCol="0" anchor="ctr"/>
+          <a:lstStyle/>
+          <a:p>
+            <a:pPr algn="ctr"/>
+            <a:r>
+              <a:rPr lang="en-US" sz="1400" i="1" noProof="0" dirty="0">
+                <a:solidFill>
+                  <a:srgbClr val="4B585A"/>
+                </a:solidFill>
+              </a:rPr>
+              <a:t>optional</a:t>
+            </a:r>
+          </a:p>
+        </p:txBody>
+      </p:sp>
+      <p:cxnSp>
+        <p:nvCxnSpPr>
+          <p:cNvPr id="1352" name="Curved Connector 1351">
+            <a:extLst>
+              <a:ext uri="{FF2B5EF4-FFF2-40B4-BE49-F238E27FC236}">
+                <a16:creationId xmlns:a16="http://schemas.microsoft.com/office/drawing/2014/main" id="{7F2032FE-C1E9-0AE9-B3EE-D8A66092BE87}"/>
+              </a:ext>
+            </a:extLst>
+          </p:cNvPr>
+          <p:cNvCxnSpPr>
+            <a:cxnSpLocks/>
+            <a:stCxn id="5" idx="1"/>
+            <a:endCxn id="22" idx="4"/>
+          </p:cNvCxnSpPr>
+          <p:nvPr/>
+        </p:nvCxnSpPr>
+        <p:spPr>
+          <a:xfrm>
+            <a:off x="9632702" y="2975176"/>
+            <a:ext cx="275197" cy="55152"/>
+          </a:xfrm>
+          <a:prstGeom prst="curvedConnector3">
+            <a:avLst/>
+          </a:prstGeom>
+          <a:ln>
+            <a:solidFill>
+              <a:srgbClr val="4B585A"/>
+            </a:solidFill>
+            <a:prstDash val="sysDot"/>
+            <a:tailEnd type="triangle"/>
+          </a:ln>
+        </p:spPr>
+        <p:style>
+          <a:lnRef idx="2">
+            <a:schemeClr val="accent1"/>
+          </a:lnRef>
+          <a:fillRef idx="0">
+            <a:schemeClr val="accent1"/>
+          </a:fillRef>
+          <a:effectRef idx="1">
+            <a:schemeClr val="accent1"/>
+          </a:effectRef>
+          <a:fontRef idx="minor">
+            <a:schemeClr val="tx1"/>
+          </a:fontRef>
+        </p:style>
+      </p:cxnSp>
+      <p:cxnSp>
+        <p:nvCxnSpPr>
+          <p:cNvPr id="1358" name="Curved Connector 1357">
+            <a:extLst>
+              <a:ext uri="{FF2B5EF4-FFF2-40B4-BE49-F238E27FC236}">
+                <a16:creationId xmlns:a16="http://schemas.microsoft.com/office/drawing/2014/main" id="{50B7BD08-3DC3-BD8F-3DBB-7CC787124541}"/>
+              </a:ext>
+            </a:extLst>
+          </p:cNvPr>
+          <p:cNvCxnSpPr>
+            <a:cxnSpLocks/>
+            <a:stCxn id="14" idx="3"/>
+            <a:endCxn id="19" idx="4"/>
+          </p:cNvCxnSpPr>
+          <p:nvPr/>
+        </p:nvCxnSpPr>
+        <p:spPr>
+          <a:xfrm flipV="1">
+            <a:off x="6802964" y="4439343"/>
+            <a:ext cx="3104935" cy="4235"/>
+          </a:xfrm>
+          <a:prstGeom prst="curvedConnector3">
+            <a:avLst/>
+          </a:prstGeom>
+          <a:ln>
+            <a:solidFill>
+              <a:srgbClr val="4B585A"/>
+            </a:solidFill>
+            <a:prstDash val="sysDot"/>
+            <a:tailEnd type="triangle"/>
+          </a:ln>
+        </p:spPr>
+        <p:style>
+          <a:lnRef idx="2">
+            <a:schemeClr val="accent1"/>
+          </a:lnRef>
+          <a:fillRef idx="0">
+            <a:schemeClr val="accent1"/>
+          </a:fillRef>
+          <a:effectRef idx="1">
+            <a:schemeClr val="accent1"/>
+          </a:effectRef>
+          <a:fontRef idx="minor">
+            <a:schemeClr val="tx1"/>
+          </a:fontRef>
+        </p:style>
+      </p:cxnSp>
+      <p:cxnSp>
+        <p:nvCxnSpPr>
+          <p:cNvPr id="1359" name="Curved Connector 1358">
+            <a:extLst>
+              <a:ext uri="{FF2B5EF4-FFF2-40B4-BE49-F238E27FC236}">
+                <a16:creationId xmlns:a16="http://schemas.microsoft.com/office/drawing/2014/main" id="{19048853-DFE6-4E99-2BB4-7AFDF1D3A5B6}"/>
+              </a:ext>
+            </a:extLst>
+          </p:cNvPr>
+          <p:cNvCxnSpPr>
+            <a:cxnSpLocks/>
+            <a:stCxn id="6" idx="1"/>
+            <a:endCxn id="21" idx="4"/>
+          </p:cNvCxnSpPr>
+          <p:nvPr/>
+        </p:nvCxnSpPr>
+        <p:spPr>
+          <a:xfrm flipV="1">
+            <a:off x="9632702" y="3328077"/>
+            <a:ext cx="275197" cy="205274"/>
+          </a:xfrm>
+          <a:prstGeom prst="curvedConnector3">
+            <a:avLst/>
+          </a:prstGeom>
+          <a:ln>
+            <a:solidFill>
+              <a:srgbClr val="4B585A"/>
+            </a:solidFill>
+            <a:prstDash val="sysDot"/>
+            <a:tailEnd type="triangle"/>
+          </a:ln>
+        </p:spPr>
+        <p:style>
+          <a:lnRef idx="2">
+            <a:schemeClr val="accent1"/>
+          </a:lnRef>
+          <a:fillRef idx="0">
+            <a:schemeClr val="accent1"/>
+          </a:fillRef>
+          <a:effectRef idx="1">
+            <a:schemeClr val="accent1"/>
+          </a:effectRef>
+          <a:fontRef idx="minor">
+            <a:schemeClr val="tx1"/>
+          </a:fontRef>
+        </p:style>
+      </p:cxnSp>
+      <p:cxnSp>
+        <p:nvCxnSpPr>
+          <p:cNvPr id="1362" name="Curved Connector 1361">
+            <a:extLst>
+              <a:ext uri="{FF2B5EF4-FFF2-40B4-BE49-F238E27FC236}">
+                <a16:creationId xmlns:a16="http://schemas.microsoft.com/office/drawing/2014/main" id="{43E69DE2-959E-7C13-59BC-FD315E25C06A}"/>
+              </a:ext>
+            </a:extLst>
+          </p:cNvPr>
+          <p:cNvCxnSpPr>
+            <a:cxnSpLocks/>
+            <a:stCxn id="7" idx="1"/>
+            <a:endCxn id="29" idx="4"/>
+          </p:cNvCxnSpPr>
+          <p:nvPr/>
+        </p:nvCxnSpPr>
+        <p:spPr>
+          <a:xfrm flipV="1">
+            <a:off x="9632704" y="3892349"/>
+            <a:ext cx="275195" cy="208917"/>
+          </a:xfrm>
+          <a:prstGeom prst="curvedConnector3">
+            <a:avLst/>
+          </a:prstGeom>
+          <a:ln>
+            <a:solidFill>
+              <a:srgbClr val="4B585A"/>
+            </a:solidFill>
+            <a:prstDash val="sysDot"/>
+            <a:tailEnd type="triangle"/>
+          </a:ln>
+        </p:spPr>
+        <p:style>
+          <a:lnRef idx="2">
+            <a:schemeClr val="accent1"/>
+          </a:lnRef>
+          <a:fillRef idx="0">
+            <a:schemeClr val="accent1"/>
+          </a:fillRef>
+          <a:effectRef idx="1">
+            <a:schemeClr val="accent1"/>
+          </a:effectRef>
+          <a:fontRef idx="minor">
+            <a:schemeClr val="tx1"/>
+          </a:fontRef>
+        </p:style>
+      </p:cxnSp>
+      <p:sp>
+        <p:nvSpPr>
+          <p:cNvPr id="1490" name="Rounded Rectangle 1489">
+            <a:extLst>
+              <a:ext uri="{FF2B5EF4-FFF2-40B4-BE49-F238E27FC236}">
+                <a16:creationId xmlns:a16="http://schemas.microsoft.com/office/drawing/2014/main" id="{7B286449-54DB-DD9D-9CA9-DD76352E5AA7}"/>
+              </a:ext>
+            </a:extLst>
+          </p:cNvPr>
+          <p:cNvSpPr/>
+          <p:nvPr/>
+        </p:nvSpPr>
+        <p:spPr>
+          <a:xfrm>
+            <a:off x="5874154" y="4618708"/>
+            <a:ext cx="907241" cy="236836"/>
+          </a:xfrm>
+          <a:prstGeom prst="roundRect">
+            <a:avLst/>
+          </a:prstGeom>
+          <a:noFill/>
+          <a:ln>
+            <a:noFill/>
+          </a:ln>
+        </p:spPr>
+        <p:style>
+          <a:lnRef idx="2">
+            <a:schemeClr val="accent1">
+              <a:shade val="15000"/>
+            </a:schemeClr>
+          </a:lnRef>
+          <a:fillRef idx="1">
+            <a:schemeClr val="accent1"/>
+          </a:fillRef>
+          <a:effectRef idx="0">
+            <a:schemeClr val="accent1"/>
+          </a:effectRef>
+          <a:fontRef idx="minor">
+            <a:schemeClr val="lt1"/>
+          </a:fontRef>
+        </p:style>
+        <p:txBody>
+          <a:bodyPr rtlCol="0" anchor="ctr"/>
+          <a:lstStyle/>
+          <a:p>
+            <a:pPr algn="ctr"/>
+            <a:r>
+              <a:rPr lang="en-US" sz="1400" i="1" noProof="0" dirty="0">
+                <a:solidFill>
+                  <a:srgbClr val="4B585A"/>
+                </a:solidFill>
+              </a:rPr>
+              <a:t>optional</a:t>
             </a:r>
           </a:p>
         </p:txBody>
@@ -6159,8 +6257,8 @@
         </p:nvSpPr>
         <p:spPr>
           <a:xfrm>
-            <a:off x="3732786" y="1117642"/>
-            <a:ext cx="4265259" cy="2523114"/>
+            <a:off x="3732786" y="1117641"/>
+            <a:ext cx="4562448" cy="2491833"/>
           </a:xfrm>
           <a:prstGeom prst="rect">
             <a:avLst/>
@@ -6212,10 +6310,10 @@
         </p:nvGrpSpPr>
         <p:grpSpPr>
           <a:xfrm>
-            <a:off x="3732786" y="736258"/>
-            <a:ext cx="4265259" cy="381384"/>
-            <a:chOff x="1288748" y="650369"/>
-            <a:chExt cx="4265259" cy="381384"/>
+            <a:off x="3732786" y="735891"/>
+            <a:ext cx="4562448" cy="453696"/>
+            <a:chOff x="1288749" y="650061"/>
+            <a:chExt cx="3833755" cy="381233"/>
           </a:xfrm>
         </p:grpSpPr>
         <p:sp>
@@ -6232,8 +6330,8 @@
           </p:nvSpPr>
           <p:spPr>
             <a:xfrm>
-              <a:off x="1288748" y="650369"/>
-              <a:ext cx="4265259" cy="380925"/>
+              <a:off x="1288749" y="650369"/>
+              <a:ext cx="3833755" cy="380925"/>
             </a:xfrm>
             <a:prstGeom prst="rect">
               <a:avLst/>
@@ -6301,8 +6399,8 @@
           </p:blipFill>
           <p:spPr bwMode="auto">
             <a:xfrm>
-              <a:off x="1378374" y="692147"/>
-              <a:ext cx="277888" cy="309003"/>
+              <a:off x="1355488" y="669878"/>
+              <a:ext cx="300775" cy="334453"/>
             </a:xfrm>
             <a:prstGeom prst="rect">
               <a:avLst/>
@@ -6333,8 +6431,8 @@
           </p:nvSpPr>
           <p:spPr>
             <a:xfrm>
-              <a:off x="1656262" y="654370"/>
-              <a:ext cx="1156457" cy="377383"/>
+              <a:off x="1607573" y="650061"/>
+              <a:ext cx="1219991" cy="377314"/>
             </a:xfrm>
             <a:prstGeom prst="roundRect">
               <a:avLst/>
@@ -6365,13 +6463,18 @@
             <a:lstStyle/>
             <a:p>
               <a:r>
-                <a:rPr lang="en-US" sz="1100" noProof="0" dirty="0">
+                <a:rPr lang="en-US" sz="1600" noProof="0" dirty="0">
                   <a:solidFill>
                     <a:schemeClr val="bg1"/>
                   </a:solidFill>
                 </a:rPr>
                 <a:t>Lighter</a:t>
               </a:r>
+              <a:endParaRPr lang="en-US" sz="1100" noProof="0" dirty="0">
+                <a:solidFill>
+                  <a:schemeClr val="bg1"/>
+                </a:solidFill>
+              </a:endParaRPr>
             </a:p>
           </p:txBody>
         </p:sp>
@@ -6390,10 +6493,10 @@
         </p:nvGrpSpPr>
         <p:grpSpPr>
           <a:xfrm>
-            <a:off x="8328835" y="736259"/>
-            <a:ext cx="1857814" cy="380924"/>
-            <a:chOff x="9368125" y="736718"/>
-            <a:chExt cx="1857814" cy="380924"/>
+            <a:off x="8658210" y="727673"/>
+            <a:ext cx="2097452" cy="467096"/>
+            <a:chOff x="9368125" y="733110"/>
+            <a:chExt cx="1762457" cy="392493"/>
           </a:xfrm>
         </p:grpSpPr>
         <p:sp>
@@ -6410,8 +6513,8 @@
           </p:nvSpPr>
           <p:spPr>
             <a:xfrm>
-              <a:off x="9368125" y="736718"/>
-              <a:ext cx="1857814" cy="377382"/>
+              <a:off x="9368125" y="736717"/>
+              <a:ext cx="1762457" cy="384532"/>
             </a:xfrm>
             <a:prstGeom prst="rect">
               <a:avLst/>
@@ -6464,8 +6567,8 @@
           </p:nvSpPr>
           <p:spPr>
             <a:xfrm>
-              <a:off x="9704041" y="740259"/>
-              <a:ext cx="1521898" cy="377383"/>
+              <a:off x="9656623" y="733110"/>
+              <a:ext cx="1473959" cy="392493"/>
             </a:xfrm>
             <a:prstGeom prst="roundRect">
               <a:avLst/>
@@ -6496,7 +6599,7 @@
             <a:lstStyle/>
             <a:p>
               <a:r>
-                <a:rPr lang="en-US" sz="1100" noProof="0" dirty="0">
+                <a:rPr lang="en-US" sz="1400" noProof="0" dirty="0">
                   <a:solidFill>
                     <a:schemeClr val="bg1"/>
                   </a:solidFill>
@@ -6528,8 +6631,8 @@
           </p:blipFill>
           <p:spPr>
             <a:xfrm>
-              <a:off x="9441242" y="776242"/>
-              <a:ext cx="262799" cy="305415"/>
+              <a:off x="9434154" y="761253"/>
+              <a:ext cx="282784" cy="328642"/>
             </a:xfrm>
             <a:prstGeom prst="rect">
               <a:avLst/>
@@ -6551,8 +6654,8 @@
         </p:nvSpPr>
         <p:spPr>
           <a:xfrm>
-            <a:off x="1544182" y="1113044"/>
-            <a:ext cx="1852947" cy="2529317"/>
+            <a:off x="1272356" y="1184923"/>
+            <a:ext cx="2097452" cy="2424551"/>
           </a:xfrm>
           <a:prstGeom prst="rect">
             <a:avLst/>
@@ -6604,8 +6707,8 @@
         </p:nvSpPr>
         <p:spPr>
           <a:xfrm>
-            <a:off x="1544182" y="736258"/>
-            <a:ext cx="1852947" cy="377007"/>
+            <a:off x="1272356" y="735891"/>
+            <a:ext cx="2104967" cy="448666"/>
           </a:xfrm>
           <a:prstGeom prst="rect">
             <a:avLst/>
@@ -6658,8 +6761,8 @@
         </p:nvSpPr>
         <p:spPr>
           <a:xfrm>
-            <a:off x="1927463" y="740549"/>
-            <a:ext cx="1474533" cy="377007"/>
+            <a:off x="1658673" y="735525"/>
+            <a:ext cx="1705202" cy="445106"/>
           </a:xfrm>
           <a:prstGeom prst="roundRect">
             <a:avLst/>
@@ -6690,13 +6793,18 @@
           <a:lstStyle/>
           <a:p>
             <a:r>
-              <a:rPr lang="en-US" sz="1100" noProof="0" dirty="0">
+              <a:rPr lang="en-US" sz="1400" noProof="0" dirty="0">
                 <a:solidFill>
                   <a:schemeClr val="bg1"/>
                 </a:solidFill>
               </a:rPr>
               <a:t>MONAI</a:t>
             </a:r>
+            <a:endParaRPr lang="en-US" sz="1100" noProof="0" dirty="0">
+              <a:solidFill>
+                <a:schemeClr val="bg1"/>
+              </a:solidFill>
+            </a:endParaRPr>
           </a:p>
         </p:txBody>
       </p:sp>
@@ -6714,8 +6822,8 @@
         </p:nvSpPr>
         <p:spPr>
           <a:xfrm>
-            <a:off x="8664751" y="2797628"/>
-            <a:ext cx="1230313" cy="473671"/>
+            <a:off x="8981542" y="2760060"/>
+            <a:ext cx="1464162" cy="563703"/>
           </a:xfrm>
           <a:prstGeom prst="rect">
             <a:avLst/>
@@ -6750,13 +6858,18 @@
           <a:p>
             <a:pPr algn="ctr"/>
             <a:r>
-              <a:rPr lang="en-US" sz="1100" b="1" dirty="0">
+              <a:rPr lang="en-US" sz="1400" b="1" dirty="0">
                 <a:solidFill>
                   <a:srgbClr val="6815D9"/>
                 </a:solidFill>
               </a:rPr>
               <a:t>Trainer</a:t>
             </a:r>
+            <a:endParaRPr lang="en-US" sz="1100" b="1" dirty="0">
+              <a:solidFill>
+                <a:srgbClr val="6815D9"/>
+              </a:solidFill>
+            </a:endParaRPr>
           </a:p>
         </p:txBody>
       </p:sp>
@@ -6774,8 +6887,8 @@
         </p:nvSpPr>
         <p:spPr>
           <a:xfrm>
-            <a:off x="8658724" y="1443696"/>
-            <a:ext cx="1230314" cy="473671"/>
+            <a:off x="8979461" y="1437393"/>
+            <a:ext cx="1464163" cy="563703"/>
           </a:xfrm>
           <a:prstGeom prst="rect">
             <a:avLst/>
@@ -6810,13 +6923,18 @@
           <a:p>
             <a:pPr algn="ctr"/>
             <a:r>
-              <a:rPr lang="en-US" sz="1100" dirty="0">
+              <a:rPr lang="en-US" sz="1400" dirty="0">
                 <a:solidFill>
                   <a:srgbClr val="6815D9"/>
                 </a:solidFill>
               </a:rPr>
               <a:t>LightningModule</a:t>
             </a:r>
+            <a:endParaRPr lang="en-US" sz="1100" dirty="0">
+              <a:solidFill>
+                <a:srgbClr val="6815D9"/>
+              </a:solidFill>
+            </a:endParaRPr>
           </a:p>
         </p:txBody>
       </p:sp>
@@ -6834,8 +6952,8 @@
         </p:nvSpPr>
         <p:spPr>
           <a:xfrm>
-            <a:off x="6458572" y="1453890"/>
-            <a:ext cx="1230313" cy="473671"/>
+            <a:off x="6472810" y="1442575"/>
+            <a:ext cx="1464162" cy="563703"/>
           </a:xfrm>
           <a:prstGeom prst="rect">
             <a:avLst/>
@@ -6870,7 +6988,7 @@
           <a:p>
             <a:pPr algn="ctr"/>
             <a:r>
-              <a:rPr lang="en-US" sz="1100" b="1" dirty="0">
+              <a:rPr lang="en-US" sz="1400" b="1" dirty="0">
                 <a:solidFill>
                   <a:srgbClr val="459AA3"/>
                 </a:solidFill>
@@ -6894,8 +7012,8 @@
         </p:nvSpPr>
         <p:spPr>
           <a:xfrm>
-            <a:off x="1832102" y="1443697"/>
-            <a:ext cx="1230314" cy="473671"/>
+            <a:off x="1588999" y="1426487"/>
+            <a:ext cx="1464163" cy="563703"/>
           </a:xfrm>
           <a:prstGeom prst="rect">
             <a:avLst/>
@@ -6930,7 +7048,7 @@
           <a:p>
             <a:pPr algn="ctr"/>
             <a:r>
-              <a:rPr lang="en-US" sz="1100" dirty="0">
+              <a:rPr lang="en-US" sz="1400" dirty="0">
                 <a:solidFill>
                   <a:srgbClr val="04769C"/>
                 </a:solidFill>
@@ -6954,8 +7072,8 @@
         </p:nvSpPr>
         <p:spPr>
           <a:xfrm>
-            <a:off x="4069187" y="1453890"/>
-            <a:ext cx="1230313" cy="473671"/>
+            <a:off x="4094542" y="1436519"/>
+            <a:ext cx="1464162" cy="563703"/>
           </a:xfrm>
           <a:prstGeom prst="rect">
             <a:avLst/>
@@ -6990,7 +7108,7 @@
           <a:p>
             <a:pPr algn="ctr"/>
             <a:r>
-              <a:rPr lang="en-US" sz="1100" b="1" dirty="0">
+              <a:rPr lang="en-US" sz="1600" b="1" dirty="0">
                 <a:solidFill>
                   <a:srgbClr val="459AA3"/>
                 </a:solidFill>
@@ -7014,8 +7132,8 @@
         </p:nvSpPr>
         <p:spPr>
           <a:xfrm>
-            <a:off x="5247825" y="2800493"/>
-            <a:ext cx="1230313" cy="473671"/>
+            <a:off x="5171372" y="2760652"/>
+            <a:ext cx="1464162" cy="563703"/>
           </a:xfrm>
           <a:prstGeom prst="rect">
             <a:avLst/>
@@ -7050,7 +7168,7 @@
           <a:p>
             <a:pPr algn="ctr"/>
             <a:r>
-              <a:rPr lang="en-US" sz="1100" dirty="0">
+              <a:rPr lang="en-US" sz="1400" dirty="0">
                 <a:solidFill>
                   <a:srgbClr val="459AA3"/>
                 </a:solidFill>
@@ -7082,8 +7200,8 @@
         </p:blipFill>
         <p:spPr>
           <a:xfrm>
-            <a:off x="1632599" y="774927"/>
-            <a:ext cx="309002" cy="309002"/>
+            <a:off x="1338274" y="766342"/>
+            <a:ext cx="393269" cy="393269"/>
           </a:xfrm>
           <a:prstGeom prst="rect">
             <a:avLst/>
@@ -7104,8 +7222,8 @@
         </p:nvSpPr>
         <p:spPr>
           <a:xfrm>
-            <a:off x="8328835" y="1113044"/>
-            <a:ext cx="1857814" cy="2527712"/>
+            <a:off x="8658212" y="1189502"/>
+            <a:ext cx="2097452" cy="2403974"/>
           </a:xfrm>
           <a:prstGeom prst="rect">
             <a:avLst/>
@@ -7154,18 +7272,20 @@
           </p:cNvPr>
           <p:cNvCxnSpPr>
             <a:cxnSpLocks/>
+            <a:stCxn id="60" idx="2"/>
+            <a:endCxn id="61" idx="1"/>
           </p:cNvCxnSpPr>
           <p:nvPr/>
         </p:nvCxnSpPr>
         <p:spPr>
           <a:xfrm>
-            <a:off x="4781786" y="1945541"/>
-            <a:ext cx="943564" cy="852087"/>
+            <a:off x="4826623" y="2000222"/>
+            <a:ext cx="344749" cy="1042282"/>
           </a:xfrm>
           <a:prstGeom prst="straightConnector1">
             <a:avLst/>
           </a:prstGeom>
-          <a:ln w="6350">
+          <a:ln w="19050">
             <a:solidFill>
               <a:srgbClr val="4B585A"/>
             </a:solidFill>
@@ -7201,8 +7321,8 @@
         </p:nvSpPr>
         <p:spPr>
           <a:xfrm>
-            <a:off x="4827426" y="2270184"/>
-            <a:ext cx="743971" cy="177242"/>
+            <a:off x="4494021" y="2321371"/>
+            <a:ext cx="885380" cy="181291"/>
           </a:xfrm>
           <a:prstGeom prst="roundRect">
             <a:avLst/>
@@ -7236,14 +7356,14 @@
           <a:p>
             <a:pPr algn="ctr"/>
             <a:r>
-              <a:rPr lang="en-US" sz="900" i="1" dirty="0">
+              <a:rPr lang="en-US" sz="1200" i="1" dirty="0">
                 <a:solidFill>
                   <a:srgbClr val="4B585A"/>
                 </a:solidFill>
               </a:rPr>
               <a:t>Loaded by</a:t>
             </a:r>
-            <a:endParaRPr lang="en-US" sz="900" i="1" noProof="0" dirty="0">
+            <a:endParaRPr lang="en-US" sz="1200" i="1" noProof="0" dirty="0">
               <a:solidFill>
                 <a:srgbClr val="4B585A"/>
               </a:solidFill>
@@ -7269,13 +7389,13 @@
         </p:nvCxnSpPr>
         <p:spPr>
           <a:xfrm>
-            <a:off x="3062416" y="1680533"/>
-            <a:ext cx="1006771" cy="10193"/>
+            <a:off x="3053162" y="1708339"/>
+            <a:ext cx="1041380" cy="10032"/>
           </a:xfrm>
           <a:prstGeom prst="straightConnector1">
             <a:avLst/>
           </a:prstGeom>
-          <a:ln w="6350">
+          <a:ln w="19050">
             <a:solidFill>
               <a:srgbClr val="4B585A"/>
             </a:solidFill>
@@ -7308,18 +7428,20 @@
           </p:cNvPr>
           <p:cNvCxnSpPr>
             <a:cxnSpLocks/>
+            <a:stCxn id="61" idx="3"/>
+            <a:endCxn id="56" idx="2"/>
           </p:cNvCxnSpPr>
           <p:nvPr/>
         </p:nvCxnSpPr>
         <p:spPr>
           <a:xfrm flipV="1">
-            <a:off x="6016935" y="1949213"/>
-            <a:ext cx="927242" cy="848415"/>
+            <a:off x="6635534" y="2006278"/>
+            <a:ext cx="569357" cy="1036226"/>
           </a:xfrm>
           <a:prstGeom prst="straightConnector1">
             <a:avLst/>
           </a:prstGeom>
-          <a:ln w="6350">
+          <a:ln w="19050">
             <a:solidFill>
               <a:srgbClr val="4B585A"/>
             </a:solidFill>
@@ -7359,13 +7481,13 @@
         </p:nvCxnSpPr>
         <p:spPr>
           <a:xfrm flipV="1">
-            <a:off x="6478138" y="3034464"/>
-            <a:ext cx="2186613" cy="2865"/>
+            <a:off x="6635534" y="3041912"/>
+            <a:ext cx="2346008" cy="592"/>
           </a:xfrm>
           <a:prstGeom prst="straightConnector1">
             <a:avLst/>
           </a:prstGeom>
-          <a:ln w="6350">
+          <a:ln w="19050">
             <a:solidFill>
               <a:srgbClr val="4B585A"/>
             </a:solidFill>
@@ -7405,13 +7527,13 @@
         </p:nvCxnSpPr>
         <p:spPr>
           <a:xfrm flipV="1">
-            <a:off x="7688885" y="1680532"/>
-            <a:ext cx="969839" cy="10194"/>
+            <a:off x="7936972" y="1719245"/>
+            <a:ext cx="1042489" cy="5182"/>
           </a:xfrm>
           <a:prstGeom prst="straightConnector1">
             <a:avLst/>
           </a:prstGeom>
-          <a:ln w="6350">
+          <a:ln w="19050">
             <a:solidFill>
               <a:srgbClr val="4B585A"/>
             </a:solidFill>
@@ -7447,8 +7569,8 @@
         </p:nvSpPr>
         <p:spPr>
           <a:xfrm>
-            <a:off x="7884397" y="1614877"/>
-            <a:ext cx="578814" cy="177242"/>
+            <a:off x="8085760" y="1489485"/>
+            <a:ext cx="735594" cy="210931"/>
           </a:xfrm>
           <a:prstGeom prst="roundRect">
             <a:avLst/>
@@ -7482,14 +7604,14 @@
           <a:p>
             <a:pPr algn="ctr"/>
             <a:r>
-              <a:rPr lang="en-US" sz="900" i="1" dirty="0">
+              <a:rPr lang="en-US" sz="1200" i="1" dirty="0">
                 <a:solidFill>
                   <a:srgbClr val="4B585A"/>
                 </a:solidFill>
               </a:rPr>
               <a:t>Inherits</a:t>
             </a:r>
-            <a:endParaRPr lang="en-US" sz="900" i="1" noProof="0" dirty="0">
+            <a:endParaRPr lang="en-US" sz="1200" i="1" noProof="0" dirty="0">
               <a:solidFill>
                 <a:srgbClr val="4B585A"/>
               </a:solidFill>
@@ -7499,10 +7621,10 @@
       </p:sp>
       <p:sp>
         <p:nvSpPr>
-          <p:cNvPr id="3141" name="Rounded Rectangle 3140">
-            <a:extLst>
-              <a:ext uri="{FF2B5EF4-FFF2-40B4-BE49-F238E27FC236}">
-                <a16:creationId xmlns:a16="http://schemas.microsoft.com/office/drawing/2014/main" id="{6F6B3DD5-2E90-6CE2-171C-8356F7F6A37C}"/>
+          <p:cNvPr id="3142" name="Rounded Rectangle 3141">
+            <a:extLst>
+              <a:ext uri="{FF2B5EF4-FFF2-40B4-BE49-F238E27FC236}">
+                <a16:creationId xmlns:a16="http://schemas.microsoft.com/office/drawing/2014/main" id="{C5727CA0-410A-0AD1-11FF-CABFC22DAD49}"/>
               </a:ext>
             </a:extLst>
           </p:cNvPr>
@@ -7511,8 +7633,8 @@
         </p:nvSpPr>
         <p:spPr>
           <a:xfrm>
-            <a:off x="6089011" y="2270184"/>
-            <a:ext cx="848940" cy="177242"/>
+            <a:off x="7052917" y="2827481"/>
+            <a:ext cx="1587066" cy="188818"/>
           </a:xfrm>
           <a:prstGeom prst="roundRect">
             <a:avLst/>
@@ -7546,22 +7668,22 @@
           <a:p>
             <a:pPr algn="ctr"/>
             <a:r>
-              <a:rPr lang="en-US" sz="900" i="1" noProof="0" dirty="0">
+              <a:rPr lang="en-US" sz="1200" i="1" noProof="0" dirty="0">
                 <a:solidFill>
                   <a:srgbClr val="4B585A"/>
                 </a:solidFill>
               </a:rPr>
-              <a:t>Instantiates</a:t>
-            </a:r>
-          </a:p>
-        </p:txBody>
-      </p:sp>
-      <p:sp>
-        <p:nvSpPr>
-          <p:cNvPr id="3142" name="Rounded Rectangle 3141">
-            <a:extLst>
-              <a:ext uri="{FF2B5EF4-FFF2-40B4-BE49-F238E27FC236}">
-                <a16:creationId xmlns:a16="http://schemas.microsoft.com/office/drawing/2014/main" id="{C5727CA0-410A-0AD1-11FF-CABFC22DAD49}"/>
+              <a:t>Instantiates and runs</a:t>
+            </a:r>
+          </a:p>
+        </p:txBody>
+      </p:sp>
+      <p:sp>
+        <p:nvSpPr>
+          <p:cNvPr id="3151" name="Rounded Rectangle 3150">
+            <a:extLst>
+              <a:ext uri="{FF2B5EF4-FFF2-40B4-BE49-F238E27FC236}">
+                <a16:creationId xmlns:a16="http://schemas.microsoft.com/office/drawing/2014/main" id="{1A6B2435-EEA9-BA26-E6CB-C1C3259FEEFE}"/>
               </a:ext>
             </a:extLst>
           </p:cNvPr>
@@ -7570,8 +7692,8 @@
         </p:nvSpPr>
         <p:spPr>
           <a:xfrm>
-            <a:off x="6596392" y="2951050"/>
-            <a:ext cx="1296313" cy="158661"/>
+            <a:off x="3180436" y="1486442"/>
+            <a:ext cx="688831" cy="210931"/>
           </a:xfrm>
           <a:prstGeom prst="roundRect">
             <a:avLst/>
@@ -7605,22 +7727,105 @@
           <a:p>
             <a:pPr algn="ctr"/>
             <a:r>
-              <a:rPr lang="en-US" sz="900" i="1" noProof="0" dirty="0">
+              <a:rPr lang="en-US" sz="1200" i="1" dirty="0">
                 <a:solidFill>
                   <a:srgbClr val="4B585A"/>
                 </a:solidFill>
               </a:rPr>
-              <a:t>Instantiates and runs</a:t>
-            </a:r>
-          </a:p>
-        </p:txBody>
-      </p:sp>
-      <p:sp>
-        <p:nvSpPr>
-          <p:cNvPr id="3151" name="Rounded Rectangle 3150">
-            <a:extLst>
-              <a:ext uri="{FF2B5EF4-FFF2-40B4-BE49-F238E27FC236}">
-                <a16:creationId xmlns:a16="http://schemas.microsoft.com/office/drawing/2014/main" id="{1A6B2435-EEA9-BA26-E6CB-C1C3259FEEFE}"/>
+              <a:t>Parses</a:t>
+            </a:r>
+            <a:endParaRPr lang="en-US" sz="1200" i="1" noProof="0" dirty="0">
+              <a:solidFill>
+                <a:srgbClr val="4B585A"/>
+              </a:solidFill>
+            </a:endParaRPr>
+          </a:p>
+        </p:txBody>
+      </p:sp>
+      <p:cxnSp>
+        <p:nvCxnSpPr>
+          <p:cNvPr id="3178" name="Straight Arrow Connector 3177">
+            <a:extLst>
+              <a:ext uri="{FF2B5EF4-FFF2-40B4-BE49-F238E27FC236}">
+                <a16:creationId xmlns:a16="http://schemas.microsoft.com/office/drawing/2014/main" id="{58D72604-CBCA-935E-FEAB-C27F20A6B01D}"/>
+              </a:ext>
+            </a:extLst>
+          </p:cNvPr>
+          <p:cNvCxnSpPr>
+            <a:cxnSpLocks/>
+            <a:stCxn id="56" idx="3"/>
+            <a:endCxn id="53" idx="0"/>
+          </p:cNvCxnSpPr>
+          <p:nvPr/>
+        </p:nvCxnSpPr>
+        <p:spPr>
+          <a:xfrm>
+            <a:off x="7936972" y="1724427"/>
+            <a:ext cx="1776651" cy="1035633"/>
+          </a:xfrm>
+          <a:prstGeom prst="straightConnector1">
+            <a:avLst/>
+          </a:prstGeom>
+          <a:ln w="19050">
+            <a:solidFill>
+              <a:srgbClr val="4B585A"/>
+            </a:solidFill>
+            <a:tailEnd type="triangle"/>
+          </a:ln>
+        </p:spPr>
+        <p:style>
+          <a:lnRef idx="2">
+            <a:schemeClr val="accent1"/>
+          </a:lnRef>
+          <a:fillRef idx="0">
+            <a:schemeClr val="accent1"/>
+          </a:fillRef>
+          <a:effectRef idx="1">
+            <a:schemeClr val="accent1"/>
+          </a:effectRef>
+          <a:fontRef idx="minor">
+            <a:schemeClr val="tx1"/>
+          </a:fontRef>
+        </p:style>
+      </p:cxnSp>
+      <p:sp>
+        <p:nvSpPr>
+          <p:cNvPr id="35" name="TextBox 34">
+            <a:extLst>
+              <a:ext uri="{FF2B5EF4-FFF2-40B4-BE49-F238E27FC236}">
+                <a16:creationId xmlns:a16="http://schemas.microsoft.com/office/drawing/2014/main" id="{099B4C2C-29C7-05D1-ED83-6DC8BABA4473}"/>
+              </a:ext>
+            </a:extLst>
+          </p:cNvPr>
+          <p:cNvSpPr txBox="1"/>
+          <p:nvPr/>
+        </p:nvSpPr>
+        <p:spPr>
+          <a:xfrm>
+            <a:off x="11602528" y="301925"/>
+            <a:ext cx="184731" cy="369332"/>
+          </a:xfrm>
+          <a:prstGeom prst="rect">
+            <a:avLst/>
+          </a:prstGeom>
+          <a:noFill/>
+        </p:spPr>
+        <p:txBody>
+          <a:bodyPr wrap="none" rtlCol="0">
+            <a:spAutoFit/>
+          </a:bodyPr>
+          <a:lstStyle/>
+          <a:p>
+            <a:endParaRPr lang="en-US" dirty="0"/>
+          </a:p>
+        </p:txBody>
+      </p:sp>
+      <p:sp>
+        <p:nvSpPr>
+          <p:cNvPr id="51" name="Rounded Rectangle 50">
+            <a:extLst>
+              <a:ext uri="{FF2B5EF4-FFF2-40B4-BE49-F238E27FC236}">
+                <a16:creationId xmlns:a16="http://schemas.microsoft.com/office/drawing/2014/main" id="{439BCF38-D132-E2B1-B5D1-982170294187}"/>
               </a:ext>
             </a:extLst>
           </p:cNvPr>
@@ -7629,8 +7834,8 @@
         </p:nvSpPr>
         <p:spPr>
           <a:xfrm>
-            <a:off x="3230616" y="1602104"/>
-            <a:ext cx="578814" cy="177242"/>
+            <a:off x="6451288" y="2321370"/>
+            <a:ext cx="978814" cy="181291"/>
           </a:xfrm>
           <a:prstGeom prst="roundRect">
             <a:avLst/>
@@ -7664,14 +7869,14 @@
           <a:p>
             <a:pPr algn="ctr"/>
             <a:r>
-              <a:rPr lang="en-US" sz="900" i="1" dirty="0">
+              <a:rPr lang="en-US" sz="1200" i="1" dirty="0">
                 <a:solidFill>
                   <a:srgbClr val="4B585A"/>
                 </a:solidFill>
               </a:rPr>
-              <a:t>Parses</a:t>
-            </a:r>
-            <a:endParaRPr lang="en-US" sz="900" i="1" noProof="0" dirty="0">
+              <a:t>Instantiates</a:t>
+            </a:r>
+            <a:endParaRPr lang="en-US" sz="1200" i="1" noProof="0" dirty="0">
               <a:solidFill>
                 <a:srgbClr val="4B585A"/>
               </a:solidFill>
@@ -7679,57 +7884,12 @@
           </a:p>
         </p:txBody>
       </p:sp>
-      <p:cxnSp>
-        <p:nvCxnSpPr>
-          <p:cNvPr id="3178" name="Straight Arrow Connector 3177">
-            <a:extLst>
-              <a:ext uri="{FF2B5EF4-FFF2-40B4-BE49-F238E27FC236}">
-                <a16:creationId xmlns:a16="http://schemas.microsoft.com/office/drawing/2014/main" id="{58D72604-CBCA-935E-FEAB-C27F20A6B01D}"/>
-              </a:ext>
-            </a:extLst>
-          </p:cNvPr>
-          <p:cNvCxnSpPr>
-            <a:cxnSpLocks/>
-            <a:endCxn id="53" idx="0"/>
-          </p:cNvCxnSpPr>
-          <p:nvPr/>
-        </p:nvCxnSpPr>
-        <p:spPr>
-          <a:xfrm>
-            <a:off x="7231529" y="1945541"/>
-            <a:ext cx="2048379" cy="852087"/>
-          </a:xfrm>
-          <a:prstGeom prst="straightConnector1">
-            <a:avLst/>
-          </a:prstGeom>
-          <a:ln w="6350">
-            <a:solidFill>
-              <a:srgbClr val="4B585A"/>
-            </a:solidFill>
-            <a:tailEnd type="triangle"/>
-          </a:ln>
-        </p:spPr>
-        <p:style>
-          <a:lnRef idx="2">
-            <a:schemeClr val="accent1"/>
-          </a:lnRef>
-          <a:fillRef idx="0">
-            <a:schemeClr val="accent1"/>
-          </a:fillRef>
-          <a:effectRef idx="1">
-            <a:schemeClr val="accent1"/>
-          </a:effectRef>
-          <a:fontRef idx="minor">
-            <a:schemeClr val="tx1"/>
-          </a:fontRef>
-        </p:style>
-      </p:cxnSp>
-      <p:sp>
-        <p:nvSpPr>
-          <p:cNvPr id="3181" name="Rounded Rectangle 3180">
-            <a:extLst>
-              <a:ext uri="{FF2B5EF4-FFF2-40B4-BE49-F238E27FC236}">
-                <a16:creationId xmlns:a16="http://schemas.microsoft.com/office/drawing/2014/main" id="{3E8CD389-9699-CB87-74C5-2F197AE393B7}"/>
+      <p:sp>
+        <p:nvSpPr>
+          <p:cNvPr id="52" name="Rounded Rectangle 51">
+            <a:extLst>
+              <a:ext uri="{FF2B5EF4-FFF2-40B4-BE49-F238E27FC236}">
+                <a16:creationId xmlns:a16="http://schemas.microsoft.com/office/drawing/2014/main" id="{B81C47C9-C207-967E-CC3C-7C9296142417}"/>
               </a:ext>
             </a:extLst>
           </p:cNvPr>
@@ -7738,8 +7898,8 @@
         </p:nvSpPr>
         <p:spPr>
           <a:xfrm>
-            <a:off x="7829419" y="2270184"/>
-            <a:ext cx="688769" cy="177242"/>
+            <a:off x="8670522" y="2306552"/>
+            <a:ext cx="871271" cy="181291"/>
           </a:xfrm>
           <a:prstGeom prst="roundRect">
             <a:avLst/>
@@ -7773,14 +7933,14 @@
           <a:p>
             <a:pPr algn="ctr"/>
             <a:r>
-              <a:rPr lang="en-US" sz="900" i="1" dirty="0">
+              <a:rPr lang="en-US" sz="1200" i="1" dirty="0">
                 <a:solidFill>
                   <a:srgbClr val="4B585A"/>
                 </a:solidFill>
               </a:rPr>
               <a:t>Passed to</a:t>
             </a:r>
-            <a:endParaRPr lang="en-US" sz="900" i="1" noProof="0" dirty="0">
+            <a:endParaRPr lang="en-US" sz="1200" i="1" noProof="0" dirty="0">
               <a:solidFill>
                 <a:srgbClr val="4B585A"/>
               </a:solidFill>

</xml_diff>